<commit_message>
Second iteration of wireframe & Update README.md
</commit_message>
<xml_diff>
--- a/docs/Homeless Services Navigator Mockup.pptx
+++ b/docs/Homeless Services Navigator Mockup.pptx
@@ -4014,6 +4014,54 @@
       </p:grpSpPr>
       <p:sp>
         <p:nvSpPr>
+          <p:cNvPr id="40" name="Rectangle 39"/>
+          <p:cNvSpPr/>
+          <p:nvPr/>
+        </p:nvSpPr>
+        <p:spPr>
+          <a:xfrm>
+            <a:off x="4390845" y="1587260"/>
+            <a:ext cx="71887" cy="5106838"/>
+          </a:xfrm>
+          <a:prstGeom prst="rect">
+            <a:avLst/>
+          </a:prstGeom>
+          <a:solidFill>
+            <a:schemeClr val="bg1">
+              <a:lumMod val="95000"/>
+            </a:schemeClr>
+          </a:solidFill>
+          <a:ln>
+            <a:noFill/>
+          </a:ln>
+        </p:spPr>
+        <p:style>
+          <a:lnRef idx="2">
+            <a:schemeClr val="accent1">
+              <a:shade val="50000"/>
+            </a:schemeClr>
+          </a:lnRef>
+          <a:fillRef idx="1">
+            <a:schemeClr val="accent1"/>
+          </a:fillRef>
+          <a:effectRef idx="0">
+            <a:schemeClr val="accent1"/>
+          </a:effectRef>
+          <a:fontRef idx="minor">
+            <a:schemeClr val="lt1"/>
+          </a:fontRef>
+        </p:style>
+        <p:txBody>
+          <a:bodyPr rtlCol="0" anchor="ctr"/>
+          <a:lstStyle/>
+          <a:p>
+            <a:pPr algn="ctr"/>
+            <a:endParaRPr lang="en-US"/>
+          </a:p>
+        </p:txBody>
+      </p:sp>
+      <p:sp>
+        <p:nvSpPr>
           <p:cNvPr id="8" name="Title 1"/>
           <p:cNvSpPr>
             <a:spLocks noGrp="1"/>
@@ -4050,19 +4098,1883 @@
       </p:sp>
       <p:sp>
         <p:nvSpPr>
-          <p:cNvPr id="24" name="TextBox 23"/>
-          <p:cNvSpPr txBox="1"/>
+          <p:cNvPr id="5" name="Rectangle 4"/>
+          <p:cNvSpPr/>
           <p:nvPr/>
         </p:nvSpPr>
         <p:spPr>
           <a:xfrm>
-            <a:off x="103517" y="103518"/>
-            <a:ext cx="2001328" cy="369332"/>
+            <a:off x="215660" y="1587260"/>
+            <a:ext cx="4247072" cy="5106838"/>
           </a:xfrm>
           <a:prstGeom prst="rect">
             <a:avLst/>
           </a:prstGeom>
           <a:noFill/>
+          <a:ln>
+            <a:solidFill>
+              <a:schemeClr val="tx1">
+                <a:lumMod val="50000"/>
+                <a:lumOff val="50000"/>
+              </a:schemeClr>
+            </a:solidFill>
+          </a:ln>
+        </p:spPr>
+        <p:style>
+          <a:lnRef idx="2">
+            <a:schemeClr val="accent1">
+              <a:shade val="50000"/>
+            </a:schemeClr>
+          </a:lnRef>
+          <a:fillRef idx="1">
+            <a:schemeClr val="accent1"/>
+          </a:fillRef>
+          <a:effectRef idx="0">
+            <a:schemeClr val="accent1"/>
+          </a:effectRef>
+          <a:fontRef idx="minor">
+            <a:schemeClr val="lt1"/>
+          </a:fontRef>
+        </p:style>
+        <p:txBody>
+          <a:bodyPr rtlCol="0" anchor="t"/>
+          <a:lstStyle/>
+          <a:p>
+            <a:pPr algn="ctr"/>
+            <a:r>
+              <a:rPr lang="en-US" dirty="0" smtClean="0">
+                <a:solidFill>
+                  <a:schemeClr val="tx1"/>
+                </a:solidFill>
+                <a:latin typeface="Segoe UI" panose="020B0502040204020203" pitchFamily="34" charset="0"/>
+                <a:cs typeface="Segoe UI" panose="020B0502040204020203" pitchFamily="34" charset="0"/>
+              </a:rPr>
+              <a:t>Employment</a:t>
+            </a:r>
+            <a:endParaRPr lang="en-US" dirty="0">
+              <a:solidFill>
+                <a:schemeClr val="tx1"/>
+              </a:solidFill>
+              <a:latin typeface="Segoe UI" panose="020B0502040204020203" pitchFamily="34" charset="0"/>
+              <a:cs typeface="Segoe UI" panose="020B0502040204020203" pitchFamily="34" charset="0"/>
+            </a:endParaRPr>
+          </a:p>
+        </p:txBody>
+      </p:sp>
+      <p:sp>
+        <p:nvSpPr>
+          <p:cNvPr id="25" name="Rectangle 24"/>
+          <p:cNvSpPr/>
+          <p:nvPr/>
+        </p:nvSpPr>
+        <p:spPr>
+          <a:xfrm>
+            <a:off x="4620399" y="1587260"/>
+            <a:ext cx="4247072" cy="5106838"/>
+          </a:xfrm>
+          <a:prstGeom prst="rect">
+            <a:avLst/>
+          </a:prstGeom>
+          <a:noFill/>
+          <a:ln>
+            <a:solidFill>
+              <a:schemeClr val="tx1">
+                <a:lumMod val="50000"/>
+                <a:lumOff val="50000"/>
+              </a:schemeClr>
+            </a:solidFill>
+          </a:ln>
+        </p:spPr>
+        <p:style>
+          <a:lnRef idx="2">
+            <a:schemeClr val="accent1">
+              <a:shade val="50000"/>
+            </a:schemeClr>
+          </a:lnRef>
+          <a:fillRef idx="1">
+            <a:schemeClr val="accent1"/>
+          </a:fillRef>
+          <a:effectRef idx="0">
+            <a:schemeClr val="accent1"/>
+          </a:effectRef>
+          <a:fontRef idx="minor">
+            <a:schemeClr val="lt1"/>
+          </a:fontRef>
+        </p:style>
+        <p:txBody>
+          <a:bodyPr rtlCol="0" anchor="t"/>
+          <a:lstStyle/>
+          <a:p>
+            <a:pPr algn="ctr"/>
+            <a:r>
+              <a:rPr lang="en-US" dirty="0" smtClean="0">
+                <a:solidFill>
+                  <a:schemeClr val="tx1"/>
+                </a:solidFill>
+                <a:latin typeface="Segoe UI" panose="020B0502040204020203" pitchFamily="34" charset="0"/>
+                <a:cs typeface="Segoe UI" panose="020B0502040204020203" pitchFamily="34" charset="0"/>
+              </a:rPr>
+              <a:t>Physical &amp; Mental Health</a:t>
+            </a:r>
+            <a:endParaRPr lang="en-US" dirty="0">
+              <a:solidFill>
+                <a:schemeClr val="tx1"/>
+              </a:solidFill>
+              <a:latin typeface="Segoe UI" panose="020B0502040204020203" pitchFamily="34" charset="0"/>
+              <a:cs typeface="Segoe UI" panose="020B0502040204020203" pitchFamily="34" charset="0"/>
+            </a:endParaRPr>
+          </a:p>
+        </p:txBody>
+      </p:sp>
+      <p:sp>
+        <p:nvSpPr>
+          <p:cNvPr id="6" name="Rectangle 5"/>
+          <p:cNvSpPr/>
+          <p:nvPr/>
+        </p:nvSpPr>
+        <p:spPr>
+          <a:xfrm>
+            <a:off x="420302" y="2493034"/>
+            <a:ext cx="3812875" cy="1199072"/>
+          </a:xfrm>
+          <a:prstGeom prst="rect">
+            <a:avLst/>
+          </a:prstGeom>
+          <a:noFill/>
+          <a:ln>
+            <a:solidFill>
+              <a:schemeClr val="tx1">
+                <a:lumMod val="50000"/>
+                <a:lumOff val="50000"/>
+              </a:schemeClr>
+            </a:solidFill>
+          </a:ln>
+        </p:spPr>
+        <p:style>
+          <a:lnRef idx="2">
+            <a:schemeClr val="accent1">
+              <a:shade val="50000"/>
+            </a:schemeClr>
+          </a:lnRef>
+          <a:fillRef idx="1">
+            <a:schemeClr val="accent1"/>
+          </a:fillRef>
+          <a:effectRef idx="0">
+            <a:schemeClr val="accent1"/>
+          </a:effectRef>
+          <a:fontRef idx="minor">
+            <a:schemeClr val="lt1"/>
+          </a:fontRef>
+        </p:style>
+        <p:txBody>
+          <a:bodyPr rtlCol="0" anchor="t"/>
+          <a:lstStyle/>
+          <a:p>
+            <a:r>
+              <a:rPr lang="en-US" sz="1400" dirty="0" smtClean="0">
+                <a:solidFill>
+                  <a:schemeClr val="tx1"/>
+                </a:solidFill>
+                <a:latin typeface="Segoe UI" panose="020B0502040204020203" pitchFamily="34" charset="0"/>
+                <a:cs typeface="Segoe UI" panose="020B0502040204020203" pitchFamily="34" charset="0"/>
+              </a:rPr>
+              <a:t>Friendship Place</a:t>
+            </a:r>
+          </a:p>
+          <a:p>
+            <a:r>
+              <a:rPr lang="en-US" sz="1400" dirty="0" smtClean="0">
+                <a:solidFill>
+                  <a:schemeClr val="tx1"/>
+                </a:solidFill>
+                <a:latin typeface="Segoe UI" panose="020B0502040204020203" pitchFamily="34" charset="0"/>
+                <a:cs typeface="Segoe UI" panose="020B0502040204020203" pitchFamily="34" charset="0"/>
+              </a:rPr>
+              <a:t>Drop-In Center &amp; Clinic</a:t>
+            </a:r>
+          </a:p>
+          <a:p>
+            <a:r>
+              <a:rPr lang="en-US" sz="1100" dirty="0" smtClean="0">
+                <a:solidFill>
+                  <a:schemeClr val="tx1">
+                    <a:lumMod val="50000"/>
+                    <a:lumOff val="50000"/>
+                  </a:schemeClr>
+                </a:solidFill>
+                <a:latin typeface="Segoe UI" panose="020B0502040204020203" pitchFamily="34" charset="0"/>
+                <a:cs typeface="Segoe UI" panose="020B0502040204020203" pitchFamily="34" charset="0"/>
+              </a:rPr>
+              <a:t>945 G Street NW</a:t>
+            </a:r>
+          </a:p>
+          <a:p>
+            <a:r>
+              <a:rPr lang="en-US" sz="1100" dirty="0" smtClean="0">
+                <a:solidFill>
+                  <a:schemeClr val="tx1">
+                    <a:lumMod val="50000"/>
+                    <a:lumOff val="50000"/>
+                  </a:schemeClr>
+                </a:solidFill>
+                <a:latin typeface="Segoe UI" panose="020B0502040204020203" pitchFamily="34" charset="0"/>
+                <a:cs typeface="Segoe UI" panose="020B0502040204020203" pitchFamily="34" charset="0"/>
+              </a:rPr>
+              <a:t>Open until 4:00PM today</a:t>
+            </a:r>
+          </a:p>
+          <a:p>
+            <a:r>
+              <a:rPr lang="en-US" sz="1100" b="1" dirty="0" smtClean="0">
+                <a:solidFill>
+                  <a:schemeClr val="tx1"/>
+                </a:solidFill>
+                <a:latin typeface="Segoe UI" panose="020B0502040204020203" pitchFamily="34" charset="0"/>
+                <a:cs typeface="Segoe UI" panose="020B0502040204020203" pitchFamily="34" charset="0"/>
+              </a:rPr>
+              <a:t>Computers</a:t>
+            </a:r>
+            <a:r>
+              <a:rPr lang="en-US" sz="1100" dirty="0" smtClean="0">
+                <a:solidFill>
+                  <a:schemeClr val="tx1"/>
+                </a:solidFill>
+                <a:latin typeface="Segoe UI" panose="020B0502040204020203" pitchFamily="34" charset="0"/>
+                <a:cs typeface="Segoe UI" panose="020B0502040204020203" pitchFamily="34" charset="0"/>
+              </a:rPr>
+              <a:t> ● </a:t>
+            </a:r>
+            <a:r>
+              <a:rPr lang="en-US" sz="1100" b="1" dirty="0" smtClean="0">
+                <a:solidFill>
+                  <a:schemeClr val="tx1"/>
+                </a:solidFill>
+                <a:latin typeface="Segoe UI" panose="020B0502040204020203" pitchFamily="34" charset="0"/>
+                <a:cs typeface="Segoe UI" panose="020B0502040204020203" pitchFamily="34" charset="0"/>
+              </a:rPr>
+              <a:t>Medical Services </a:t>
+            </a:r>
+            <a:r>
+              <a:rPr lang="en-US" sz="1100" dirty="0" smtClean="0">
+                <a:solidFill>
+                  <a:schemeClr val="tx1">
+                    <a:lumMod val="50000"/>
+                    <a:lumOff val="50000"/>
+                  </a:schemeClr>
+                </a:solidFill>
+                <a:latin typeface="Segoe UI" panose="020B0502040204020203" pitchFamily="34" charset="0"/>
+                <a:cs typeface="Segoe UI" panose="020B0502040204020203" pitchFamily="34" charset="0"/>
+              </a:rPr>
+              <a:t>● </a:t>
+            </a:r>
+          </a:p>
+          <a:p>
+            <a:r>
+              <a:rPr lang="en-US" sz="1100" dirty="0" smtClean="0">
+                <a:solidFill>
+                  <a:schemeClr val="tx1">
+                    <a:lumMod val="50000"/>
+                    <a:lumOff val="50000"/>
+                  </a:schemeClr>
+                </a:solidFill>
+                <a:latin typeface="Segoe UI" panose="020B0502040204020203" pitchFamily="34" charset="0"/>
+                <a:cs typeface="Segoe UI" panose="020B0502040204020203" pitchFamily="34" charset="0"/>
+              </a:rPr>
+              <a:t>Case Management ● Meals ● Showers</a:t>
+            </a:r>
+            <a:endParaRPr lang="en-US" sz="1100" b="1" dirty="0" smtClean="0">
+              <a:solidFill>
+                <a:schemeClr val="tx1">
+                  <a:lumMod val="50000"/>
+                  <a:lumOff val="50000"/>
+                </a:schemeClr>
+              </a:solidFill>
+              <a:latin typeface="Segoe UI" panose="020B0502040204020203" pitchFamily="34" charset="0"/>
+              <a:cs typeface="Segoe UI" panose="020B0502040204020203" pitchFamily="34" charset="0"/>
+            </a:endParaRPr>
+          </a:p>
+          <a:p>
+            <a:endParaRPr lang="en-US" sz="1200" dirty="0">
+              <a:solidFill>
+                <a:schemeClr val="tx1"/>
+              </a:solidFill>
+              <a:latin typeface="Segoe UI" panose="020B0502040204020203" pitchFamily="34" charset="0"/>
+              <a:cs typeface="Segoe UI" panose="020B0502040204020203" pitchFamily="34" charset="0"/>
+            </a:endParaRPr>
+          </a:p>
+        </p:txBody>
+      </p:sp>
+      <p:pic>
+        <p:nvPicPr>
+          <p:cNvPr id="1026" name="Picture 2" descr="Friendship Place"/>
+          <p:cNvPicPr>
+            <a:picLocks noChangeAspect="1" noChangeArrowheads="1"/>
+          </p:cNvPicPr>
+          <p:nvPr/>
+        </p:nvPicPr>
+        <p:blipFill>
+          <a:blip r:embed="rId2" cstate="print">
+            <a:clrChange>
+              <a:clrFrom>
+                <a:srgbClr val="FFFFFF"/>
+              </a:clrFrom>
+              <a:clrTo>
+                <a:srgbClr val="FFFFFF">
+                  <a:alpha val="0"/>
+                </a:srgbClr>
+              </a:clrTo>
+            </a:clrChange>
+            <a:extLst>
+              <a:ext uri="{28A0092B-C50C-407E-A947-70E740481C1C}">
+                <a14:useLocalDpi xmlns:a14="http://schemas.microsoft.com/office/drawing/2010/main" val="0"/>
+              </a:ext>
+            </a:extLst>
+          </a:blip>
+          <a:srcRect/>
+          <a:stretch>
+            <a:fillRect/>
+          </a:stretch>
+        </p:blipFill>
+        <p:spPr bwMode="auto">
+          <a:xfrm>
+            <a:off x="3014931" y="2493034"/>
+            <a:ext cx="1218246" cy="1199072"/>
+          </a:xfrm>
+          <a:prstGeom prst="rect">
+            <a:avLst/>
+          </a:prstGeom>
+          <a:noFill/>
+          <a:ln>
+            <a:solidFill>
+              <a:schemeClr val="tx1">
+                <a:lumMod val="50000"/>
+                <a:lumOff val="50000"/>
+              </a:schemeClr>
+            </a:solidFill>
+          </a:ln>
+          <a:extLst>
+            <a:ext uri="{909E8E84-426E-40DD-AFC4-6F175D3DCCD1}">
+              <a14:hiddenFill xmlns:a14="http://schemas.microsoft.com/office/drawing/2010/main">
+                <a:solidFill>
+                  <a:srgbClr val="FFFFFF"/>
+                </a:solidFill>
+              </a14:hiddenFill>
+            </a:ext>
+          </a:extLst>
+        </p:spPr>
+      </p:pic>
+      <p:sp>
+        <p:nvSpPr>
+          <p:cNvPr id="26" name="Rectangle 25"/>
+          <p:cNvSpPr/>
+          <p:nvPr/>
+        </p:nvSpPr>
+        <p:spPr>
+          <a:xfrm>
+            <a:off x="420302" y="3821502"/>
+            <a:ext cx="3812875" cy="1199072"/>
+          </a:xfrm>
+          <a:prstGeom prst="rect">
+            <a:avLst/>
+          </a:prstGeom>
+          <a:noFill/>
+          <a:ln>
+            <a:solidFill>
+              <a:schemeClr val="tx1">
+                <a:lumMod val="50000"/>
+                <a:lumOff val="50000"/>
+              </a:schemeClr>
+            </a:solidFill>
+          </a:ln>
+        </p:spPr>
+        <p:style>
+          <a:lnRef idx="2">
+            <a:schemeClr val="accent1">
+              <a:shade val="50000"/>
+            </a:schemeClr>
+          </a:lnRef>
+          <a:fillRef idx="1">
+            <a:schemeClr val="accent1"/>
+          </a:fillRef>
+          <a:effectRef idx="0">
+            <a:schemeClr val="accent1"/>
+          </a:effectRef>
+          <a:fontRef idx="minor">
+            <a:schemeClr val="lt1"/>
+          </a:fontRef>
+        </p:style>
+        <p:txBody>
+          <a:bodyPr rtlCol="0" anchor="t"/>
+          <a:lstStyle/>
+          <a:p>
+            <a:r>
+              <a:rPr lang="en-US" sz="1400" dirty="0" smtClean="0">
+                <a:solidFill>
+                  <a:schemeClr val="tx1"/>
+                </a:solidFill>
+                <a:latin typeface="Segoe UI" panose="020B0502040204020203" pitchFamily="34" charset="0"/>
+                <a:cs typeface="Segoe UI" panose="020B0502040204020203" pitchFamily="34" charset="0"/>
+              </a:rPr>
+              <a:t>Georgetown Ministry Center</a:t>
+            </a:r>
+          </a:p>
+          <a:p>
+            <a:r>
+              <a:rPr lang="en-US" sz="1400" dirty="0" smtClean="0">
+                <a:solidFill>
+                  <a:schemeClr val="tx1"/>
+                </a:solidFill>
+                <a:latin typeface="Segoe UI" panose="020B0502040204020203" pitchFamily="34" charset="0"/>
+                <a:cs typeface="Segoe UI" panose="020B0502040204020203" pitchFamily="34" charset="0"/>
+              </a:rPr>
+              <a:t>Clubhouse Drop-In Center</a:t>
+            </a:r>
+            <a:endParaRPr lang="en-US" sz="1400" dirty="0" smtClean="0">
+              <a:solidFill>
+                <a:schemeClr val="tx1"/>
+              </a:solidFill>
+              <a:latin typeface="Segoe UI" panose="020B0502040204020203" pitchFamily="34" charset="0"/>
+              <a:cs typeface="Segoe UI" panose="020B0502040204020203" pitchFamily="34" charset="0"/>
+            </a:endParaRPr>
+          </a:p>
+          <a:p>
+            <a:r>
+              <a:rPr lang="en-US" sz="1100" dirty="0" smtClean="0">
+                <a:solidFill>
+                  <a:schemeClr val="tx1">
+                    <a:lumMod val="50000"/>
+                    <a:lumOff val="50000"/>
+                  </a:schemeClr>
+                </a:solidFill>
+                <a:latin typeface="Segoe UI" panose="020B0502040204020203" pitchFamily="34" charset="0"/>
+                <a:cs typeface="Segoe UI" panose="020B0502040204020203" pitchFamily="34" charset="0"/>
+              </a:rPr>
+              <a:t>1041 Wisconsin Avenue NW</a:t>
+            </a:r>
+          </a:p>
+          <a:p>
+            <a:r>
+              <a:rPr lang="en-US" sz="1100" dirty="0" smtClean="0">
+                <a:solidFill>
+                  <a:schemeClr val="tx1">
+                    <a:lumMod val="50000"/>
+                    <a:lumOff val="50000"/>
+                  </a:schemeClr>
+                </a:solidFill>
+                <a:latin typeface="Segoe UI" panose="020B0502040204020203" pitchFamily="34" charset="0"/>
+                <a:cs typeface="Segoe UI" panose="020B0502040204020203" pitchFamily="34" charset="0"/>
+              </a:rPr>
+              <a:t>Open until 4:00PM today</a:t>
+            </a:r>
+          </a:p>
+          <a:p>
+            <a:r>
+              <a:rPr lang="en-US" sz="1100" b="1" dirty="0" smtClean="0">
+                <a:solidFill>
+                  <a:schemeClr val="tx1"/>
+                </a:solidFill>
+                <a:latin typeface="Segoe UI" panose="020B0502040204020203" pitchFamily="34" charset="0"/>
+                <a:cs typeface="Segoe UI" panose="020B0502040204020203" pitchFamily="34" charset="0"/>
+              </a:rPr>
+              <a:t>Computers</a:t>
+            </a:r>
+            <a:r>
+              <a:rPr lang="en-US" sz="1100" dirty="0" smtClean="0">
+                <a:solidFill>
+                  <a:schemeClr val="tx1"/>
+                </a:solidFill>
+                <a:latin typeface="Segoe UI" panose="020B0502040204020203" pitchFamily="34" charset="0"/>
+                <a:cs typeface="Segoe UI" panose="020B0502040204020203" pitchFamily="34" charset="0"/>
+              </a:rPr>
+              <a:t> ● </a:t>
+            </a:r>
+            <a:r>
+              <a:rPr lang="en-US" sz="1100" b="1" dirty="0" smtClean="0">
+                <a:solidFill>
+                  <a:schemeClr val="tx1"/>
+                </a:solidFill>
+                <a:latin typeface="Segoe UI" panose="020B0502040204020203" pitchFamily="34" charset="0"/>
+                <a:cs typeface="Segoe UI" panose="020B0502040204020203" pitchFamily="34" charset="0"/>
+              </a:rPr>
+              <a:t>Medical Services </a:t>
+            </a:r>
+            <a:r>
+              <a:rPr lang="en-US" sz="1100" dirty="0" smtClean="0">
+                <a:solidFill>
+                  <a:schemeClr val="tx1">
+                    <a:lumMod val="50000"/>
+                    <a:lumOff val="50000"/>
+                  </a:schemeClr>
+                </a:solidFill>
+                <a:latin typeface="Segoe UI" panose="020B0502040204020203" pitchFamily="34" charset="0"/>
+                <a:cs typeface="Segoe UI" panose="020B0502040204020203" pitchFamily="34" charset="0"/>
+              </a:rPr>
+              <a:t>● </a:t>
+            </a:r>
+          </a:p>
+          <a:p>
+            <a:r>
+              <a:rPr lang="en-US" sz="1100" dirty="0" smtClean="0">
+                <a:solidFill>
+                  <a:schemeClr val="tx1">
+                    <a:lumMod val="50000"/>
+                    <a:lumOff val="50000"/>
+                  </a:schemeClr>
+                </a:solidFill>
+                <a:latin typeface="Segoe UI" panose="020B0502040204020203" pitchFamily="34" charset="0"/>
+                <a:cs typeface="Segoe UI" panose="020B0502040204020203" pitchFamily="34" charset="0"/>
+              </a:rPr>
+              <a:t>Art Therapy ● Case Management … </a:t>
+            </a:r>
+            <a:endParaRPr lang="en-US" sz="1200" dirty="0">
+              <a:solidFill>
+                <a:schemeClr val="tx1"/>
+              </a:solidFill>
+              <a:latin typeface="Segoe UI" panose="020B0502040204020203" pitchFamily="34" charset="0"/>
+              <a:cs typeface="Segoe UI" panose="020B0502040204020203" pitchFamily="34" charset="0"/>
+            </a:endParaRPr>
+          </a:p>
+        </p:txBody>
+      </p:sp>
+      <p:sp>
+        <p:nvSpPr>
+          <p:cNvPr id="28" name="Rectangle 27"/>
+          <p:cNvSpPr/>
+          <p:nvPr/>
+        </p:nvSpPr>
+        <p:spPr>
+          <a:xfrm>
+            <a:off x="420302" y="5149969"/>
+            <a:ext cx="3812875" cy="1199072"/>
+          </a:xfrm>
+          <a:prstGeom prst="rect">
+            <a:avLst/>
+          </a:prstGeom>
+          <a:noFill/>
+          <a:ln>
+            <a:solidFill>
+              <a:schemeClr val="tx1">
+                <a:lumMod val="50000"/>
+                <a:lumOff val="50000"/>
+              </a:schemeClr>
+            </a:solidFill>
+          </a:ln>
+        </p:spPr>
+        <p:style>
+          <a:lnRef idx="2">
+            <a:schemeClr val="accent1">
+              <a:shade val="50000"/>
+            </a:schemeClr>
+          </a:lnRef>
+          <a:fillRef idx="1">
+            <a:schemeClr val="accent1"/>
+          </a:fillRef>
+          <a:effectRef idx="0">
+            <a:schemeClr val="accent1"/>
+          </a:effectRef>
+          <a:fontRef idx="minor">
+            <a:schemeClr val="lt1"/>
+          </a:fontRef>
+        </p:style>
+        <p:txBody>
+          <a:bodyPr rtlCol="0" anchor="t"/>
+          <a:lstStyle/>
+          <a:p>
+            <a:r>
+              <a:rPr lang="en-US" sz="1400" dirty="0" smtClean="0">
+                <a:solidFill>
+                  <a:schemeClr val="tx1"/>
+                </a:solidFill>
+                <a:latin typeface="Segoe UI" panose="020B0502040204020203" pitchFamily="34" charset="0"/>
+                <a:cs typeface="Segoe UI" panose="020B0502040204020203" pitchFamily="34" charset="0"/>
+              </a:rPr>
+              <a:t>DC Public Library</a:t>
+            </a:r>
+          </a:p>
+          <a:p>
+            <a:r>
+              <a:rPr lang="en-US" sz="1400" dirty="0" smtClean="0">
+                <a:solidFill>
+                  <a:schemeClr val="tx1"/>
+                </a:solidFill>
+                <a:latin typeface="Segoe UI" panose="020B0502040204020203" pitchFamily="34" charset="0"/>
+                <a:cs typeface="Segoe UI" panose="020B0502040204020203" pitchFamily="34" charset="0"/>
+              </a:rPr>
+              <a:t>Library Express</a:t>
+            </a:r>
+          </a:p>
+          <a:p>
+            <a:r>
+              <a:rPr lang="en-US" sz="1100" dirty="0" smtClean="0">
+                <a:solidFill>
+                  <a:schemeClr val="tx1">
+                    <a:lumMod val="50000"/>
+                    <a:lumOff val="50000"/>
+                  </a:schemeClr>
+                </a:solidFill>
+                <a:latin typeface="Segoe UI" panose="020B0502040204020203" pitchFamily="34" charset="0"/>
+                <a:cs typeface="Segoe UI" panose="020B0502040204020203" pitchFamily="34" charset="0"/>
+              </a:rPr>
+              <a:t>1990 K Street NW</a:t>
+            </a:r>
+          </a:p>
+          <a:p>
+            <a:r>
+              <a:rPr lang="en-US" sz="1100" dirty="0" smtClean="0">
+                <a:solidFill>
+                  <a:schemeClr val="tx1">
+                    <a:lumMod val="50000"/>
+                    <a:lumOff val="50000"/>
+                  </a:schemeClr>
+                </a:solidFill>
+                <a:latin typeface="Segoe UI" panose="020B0502040204020203" pitchFamily="34" charset="0"/>
+                <a:cs typeface="Segoe UI" panose="020B0502040204020203" pitchFamily="34" charset="0"/>
+              </a:rPr>
+              <a:t>Open until 8:00PM today</a:t>
+            </a:r>
+          </a:p>
+          <a:p>
+            <a:r>
+              <a:rPr lang="en-US" sz="1100" b="1" dirty="0" smtClean="0">
+                <a:solidFill>
+                  <a:schemeClr val="tx1"/>
+                </a:solidFill>
+                <a:latin typeface="Segoe UI" panose="020B0502040204020203" pitchFamily="34" charset="0"/>
+                <a:cs typeface="Segoe UI" panose="020B0502040204020203" pitchFamily="34" charset="0"/>
+              </a:rPr>
+              <a:t>Adult Literacy</a:t>
+            </a:r>
+            <a:r>
+              <a:rPr lang="en-US" sz="1100" dirty="0" smtClean="0">
+                <a:solidFill>
+                  <a:schemeClr val="tx1"/>
+                </a:solidFill>
+                <a:latin typeface="Segoe UI" panose="020B0502040204020203" pitchFamily="34" charset="0"/>
+                <a:cs typeface="Segoe UI" panose="020B0502040204020203" pitchFamily="34" charset="0"/>
+              </a:rPr>
+              <a:t> ● </a:t>
+            </a:r>
+            <a:r>
+              <a:rPr lang="en-US" sz="1100" b="1" dirty="0" smtClean="0">
+                <a:solidFill>
+                  <a:schemeClr val="tx1"/>
+                </a:solidFill>
+                <a:latin typeface="Segoe UI" panose="020B0502040204020203" pitchFamily="34" charset="0"/>
+                <a:cs typeface="Segoe UI" panose="020B0502040204020203" pitchFamily="34" charset="0"/>
+              </a:rPr>
+              <a:t>Computers </a:t>
+            </a:r>
+            <a:r>
+              <a:rPr lang="en-US" sz="1100" dirty="0" smtClean="0">
+                <a:solidFill>
+                  <a:schemeClr val="tx1">
+                    <a:lumMod val="50000"/>
+                    <a:lumOff val="50000"/>
+                  </a:schemeClr>
+                </a:solidFill>
+                <a:latin typeface="Segoe UI" panose="020B0502040204020203" pitchFamily="34" charset="0"/>
+                <a:cs typeface="Segoe UI" panose="020B0502040204020203" pitchFamily="34" charset="0"/>
+              </a:rPr>
+              <a:t>● </a:t>
+            </a:r>
+          </a:p>
+          <a:p>
+            <a:r>
+              <a:rPr lang="en-US" sz="1100" dirty="0" smtClean="0">
+                <a:solidFill>
+                  <a:schemeClr val="tx1">
+                    <a:lumMod val="50000"/>
+                    <a:lumOff val="50000"/>
+                  </a:schemeClr>
+                </a:solidFill>
+                <a:latin typeface="Segoe UI" panose="020B0502040204020203" pitchFamily="34" charset="0"/>
+                <a:cs typeface="Segoe UI" panose="020B0502040204020203" pitchFamily="34" charset="0"/>
+              </a:rPr>
+              <a:t>Accessibility </a:t>
+            </a:r>
+            <a:r>
+              <a:rPr lang="en-US" sz="1100" dirty="0" smtClean="0">
+                <a:solidFill>
+                  <a:schemeClr val="tx1">
+                    <a:lumMod val="50000"/>
+                    <a:lumOff val="50000"/>
+                  </a:schemeClr>
+                </a:solidFill>
+                <a:latin typeface="Segoe UI" panose="020B0502040204020203" pitchFamily="34" charset="0"/>
+                <a:cs typeface="Segoe UI" panose="020B0502040204020203" pitchFamily="34" charset="0"/>
+              </a:rPr>
+              <a:t>● Borrow Materials … </a:t>
+            </a:r>
+            <a:endParaRPr lang="en-US" sz="1100" b="1" dirty="0" smtClean="0">
+              <a:solidFill>
+                <a:schemeClr val="tx1">
+                  <a:lumMod val="50000"/>
+                  <a:lumOff val="50000"/>
+                </a:schemeClr>
+              </a:solidFill>
+              <a:latin typeface="Segoe UI" panose="020B0502040204020203" pitchFamily="34" charset="0"/>
+              <a:cs typeface="Segoe UI" panose="020B0502040204020203" pitchFamily="34" charset="0"/>
+            </a:endParaRPr>
+          </a:p>
+          <a:p>
+            <a:endParaRPr lang="en-US" sz="1200" dirty="0">
+              <a:solidFill>
+                <a:schemeClr val="tx1"/>
+              </a:solidFill>
+              <a:latin typeface="Segoe UI" panose="020B0502040204020203" pitchFamily="34" charset="0"/>
+              <a:cs typeface="Segoe UI" panose="020B0502040204020203" pitchFamily="34" charset="0"/>
+            </a:endParaRPr>
+          </a:p>
+        </p:txBody>
+      </p:sp>
+      <p:sp>
+        <p:nvSpPr>
+          <p:cNvPr id="30" name="Rectangle 29"/>
+          <p:cNvSpPr/>
+          <p:nvPr/>
+        </p:nvSpPr>
+        <p:spPr>
+          <a:xfrm>
+            <a:off x="4825041" y="2507882"/>
+            <a:ext cx="3812875" cy="1199072"/>
+          </a:xfrm>
+          <a:prstGeom prst="rect">
+            <a:avLst/>
+          </a:prstGeom>
+          <a:noFill/>
+          <a:ln>
+            <a:solidFill>
+              <a:schemeClr val="tx1">
+                <a:lumMod val="50000"/>
+                <a:lumOff val="50000"/>
+              </a:schemeClr>
+            </a:solidFill>
+          </a:ln>
+        </p:spPr>
+        <p:style>
+          <a:lnRef idx="2">
+            <a:schemeClr val="accent1">
+              <a:shade val="50000"/>
+            </a:schemeClr>
+          </a:lnRef>
+          <a:fillRef idx="1">
+            <a:schemeClr val="accent1"/>
+          </a:fillRef>
+          <a:effectRef idx="0">
+            <a:schemeClr val="accent1"/>
+          </a:effectRef>
+          <a:fontRef idx="minor">
+            <a:schemeClr val="lt1"/>
+          </a:fontRef>
+        </p:style>
+        <p:txBody>
+          <a:bodyPr rtlCol="0" anchor="t"/>
+          <a:lstStyle/>
+          <a:p>
+            <a:r>
+              <a:rPr lang="en-US" sz="1400" dirty="0" smtClean="0">
+                <a:solidFill>
+                  <a:schemeClr val="tx1"/>
+                </a:solidFill>
+                <a:latin typeface="Segoe UI" panose="020B0502040204020203" pitchFamily="34" charset="0"/>
+                <a:cs typeface="Segoe UI" panose="020B0502040204020203" pitchFamily="34" charset="0"/>
+              </a:rPr>
+              <a:t>Friendship Place</a:t>
+            </a:r>
+          </a:p>
+          <a:p>
+            <a:r>
+              <a:rPr lang="en-US" sz="1400" dirty="0" smtClean="0">
+                <a:solidFill>
+                  <a:schemeClr val="tx1"/>
+                </a:solidFill>
+                <a:latin typeface="Segoe UI" panose="020B0502040204020203" pitchFamily="34" charset="0"/>
+                <a:cs typeface="Segoe UI" panose="020B0502040204020203" pitchFamily="34" charset="0"/>
+              </a:rPr>
+              <a:t>Drop-In Center &amp; Clinic</a:t>
+            </a:r>
+          </a:p>
+          <a:p>
+            <a:r>
+              <a:rPr lang="en-US" sz="1100" dirty="0" smtClean="0">
+                <a:solidFill>
+                  <a:schemeClr val="tx1">
+                    <a:lumMod val="50000"/>
+                    <a:lumOff val="50000"/>
+                  </a:schemeClr>
+                </a:solidFill>
+                <a:latin typeface="Segoe UI" panose="020B0502040204020203" pitchFamily="34" charset="0"/>
+                <a:cs typeface="Segoe UI" panose="020B0502040204020203" pitchFamily="34" charset="0"/>
+              </a:rPr>
+              <a:t>945 G STREET NW</a:t>
+            </a:r>
+          </a:p>
+          <a:p>
+            <a:r>
+              <a:rPr lang="en-US" sz="1100" dirty="0" smtClean="0">
+                <a:solidFill>
+                  <a:schemeClr val="tx1">
+                    <a:lumMod val="50000"/>
+                    <a:lumOff val="50000"/>
+                  </a:schemeClr>
+                </a:solidFill>
+                <a:latin typeface="Segoe UI" panose="020B0502040204020203" pitchFamily="34" charset="0"/>
+                <a:cs typeface="Segoe UI" panose="020B0502040204020203" pitchFamily="34" charset="0"/>
+              </a:rPr>
+              <a:t>Open until 4:00PM today</a:t>
+            </a:r>
+          </a:p>
+          <a:p>
+            <a:r>
+              <a:rPr lang="en-US" sz="1100" b="1" dirty="0" smtClean="0">
+                <a:solidFill>
+                  <a:schemeClr val="tx1"/>
+                </a:solidFill>
+                <a:latin typeface="Segoe UI" panose="020B0502040204020203" pitchFamily="34" charset="0"/>
+                <a:cs typeface="Segoe UI" panose="020B0502040204020203" pitchFamily="34" charset="0"/>
+              </a:rPr>
+              <a:t>Computers</a:t>
+            </a:r>
+            <a:r>
+              <a:rPr lang="en-US" sz="1100" dirty="0" smtClean="0">
+                <a:solidFill>
+                  <a:schemeClr val="tx1"/>
+                </a:solidFill>
+                <a:latin typeface="Segoe UI" panose="020B0502040204020203" pitchFamily="34" charset="0"/>
+                <a:cs typeface="Segoe UI" panose="020B0502040204020203" pitchFamily="34" charset="0"/>
+              </a:rPr>
+              <a:t> ● </a:t>
+            </a:r>
+            <a:r>
+              <a:rPr lang="en-US" sz="1100" b="1" dirty="0" smtClean="0">
+                <a:solidFill>
+                  <a:schemeClr val="tx1"/>
+                </a:solidFill>
+                <a:latin typeface="Segoe UI" panose="020B0502040204020203" pitchFamily="34" charset="0"/>
+                <a:cs typeface="Segoe UI" panose="020B0502040204020203" pitchFamily="34" charset="0"/>
+              </a:rPr>
+              <a:t>Medical Services </a:t>
+            </a:r>
+            <a:r>
+              <a:rPr lang="en-US" sz="1100" dirty="0" smtClean="0">
+                <a:solidFill>
+                  <a:schemeClr val="tx1">
+                    <a:lumMod val="50000"/>
+                    <a:lumOff val="50000"/>
+                  </a:schemeClr>
+                </a:solidFill>
+                <a:latin typeface="Segoe UI" panose="020B0502040204020203" pitchFamily="34" charset="0"/>
+                <a:cs typeface="Segoe UI" panose="020B0502040204020203" pitchFamily="34" charset="0"/>
+              </a:rPr>
+              <a:t>● </a:t>
+            </a:r>
+          </a:p>
+          <a:p>
+            <a:r>
+              <a:rPr lang="en-US" sz="1100" dirty="0" smtClean="0">
+                <a:solidFill>
+                  <a:schemeClr val="tx1">
+                    <a:lumMod val="50000"/>
+                    <a:lumOff val="50000"/>
+                  </a:schemeClr>
+                </a:solidFill>
+                <a:latin typeface="Segoe UI" panose="020B0502040204020203" pitchFamily="34" charset="0"/>
+                <a:cs typeface="Segoe UI" panose="020B0502040204020203" pitchFamily="34" charset="0"/>
+              </a:rPr>
+              <a:t>Case Management ● Meals ● Showers</a:t>
+            </a:r>
+            <a:endParaRPr lang="en-US" sz="1100" b="1" dirty="0" smtClean="0">
+              <a:solidFill>
+                <a:schemeClr val="tx1">
+                  <a:lumMod val="50000"/>
+                  <a:lumOff val="50000"/>
+                </a:schemeClr>
+              </a:solidFill>
+              <a:latin typeface="Segoe UI" panose="020B0502040204020203" pitchFamily="34" charset="0"/>
+              <a:cs typeface="Segoe UI" panose="020B0502040204020203" pitchFamily="34" charset="0"/>
+            </a:endParaRPr>
+          </a:p>
+          <a:p>
+            <a:endParaRPr lang="en-US" sz="1200" dirty="0">
+              <a:solidFill>
+                <a:schemeClr val="tx1"/>
+              </a:solidFill>
+              <a:latin typeface="Segoe UI" panose="020B0502040204020203" pitchFamily="34" charset="0"/>
+              <a:cs typeface="Segoe UI" panose="020B0502040204020203" pitchFamily="34" charset="0"/>
+            </a:endParaRPr>
+          </a:p>
+        </p:txBody>
+      </p:sp>
+      <p:pic>
+        <p:nvPicPr>
+          <p:cNvPr id="31" name="Picture 2" descr="Friendship Place"/>
+          <p:cNvPicPr>
+            <a:picLocks noChangeAspect="1" noChangeArrowheads="1"/>
+          </p:cNvPicPr>
+          <p:nvPr/>
+        </p:nvPicPr>
+        <p:blipFill>
+          <a:blip r:embed="rId2" cstate="print">
+            <a:clrChange>
+              <a:clrFrom>
+                <a:srgbClr val="FFFFFF"/>
+              </a:clrFrom>
+              <a:clrTo>
+                <a:srgbClr val="FFFFFF">
+                  <a:alpha val="0"/>
+                </a:srgbClr>
+              </a:clrTo>
+            </a:clrChange>
+            <a:extLst>
+              <a:ext uri="{28A0092B-C50C-407E-A947-70E740481C1C}">
+                <a14:useLocalDpi xmlns:a14="http://schemas.microsoft.com/office/drawing/2010/main" val="0"/>
+              </a:ext>
+            </a:extLst>
+          </a:blip>
+          <a:srcRect/>
+          <a:stretch>
+            <a:fillRect/>
+          </a:stretch>
+        </p:blipFill>
+        <p:spPr bwMode="auto">
+          <a:xfrm>
+            <a:off x="7419670" y="2507882"/>
+            <a:ext cx="1218246" cy="1199072"/>
+          </a:xfrm>
+          <a:prstGeom prst="rect">
+            <a:avLst/>
+          </a:prstGeom>
+          <a:noFill/>
+          <a:ln>
+            <a:solidFill>
+              <a:schemeClr val="tx1">
+                <a:lumMod val="50000"/>
+                <a:lumOff val="50000"/>
+              </a:schemeClr>
+            </a:solidFill>
+          </a:ln>
+          <a:extLst>
+            <a:ext uri="{909E8E84-426E-40DD-AFC4-6F175D3DCCD1}">
+              <a14:hiddenFill xmlns:a14="http://schemas.microsoft.com/office/drawing/2010/main">
+                <a:solidFill>
+                  <a:srgbClr val="FFFFFF"/>
+                </a:solidFill>
+              </a14:hiddenFill>
+            </a:ext>
+          </a:extLst>
+        </p:spPr>
+      </p:pic>
+      <p:pic>
+        <p:nvPicPr>
+          <p:cNvPr id="1028" name="Picture 4" descr="GMCFrontDoor"/>
+          <p:cNvPicPr>
+            <a:picLocks noChangeAspect="1" noChangeArrowheads="1"/>
+          </p:cNvPicPr>
+          <p:nvPr/>
+        </p:nvPicPr>
+        <p:blipFill>
+          <a:blip r:embed="rId3" cstate="print">
+            <a:extLst>
+              <a:ext uri="{28A0092B-C50C-407E-A947-70E740481C1C}">
+                <a14:useLocalDpi xmlns:a14="http://schemas.microsoft.com/office/drawing/2010/main" val="0"/>
+              </a:ext>
+            </a:extLst>
+          </a:blip>
+          <a:srcRect/>
+          <a:stretch>
+            <a:fillRect/>
+          </a:stretch>
+        </p:blipFill>
+        <p:spPr bwMode="auto">
+          <a:xfrm>
+            <a:off x="3014931" y="3821502"/>
+            <a:ext cx="1218247" cy="1199072"/>
+          </a:xfrm>
+          <a:prstGeom prst="rect">
+            <a:avLst/>
+          </a:prstGeom>
+          <a:noFill/>
+          <a:ln>
+            <a:solidFill>
+              <a:schemeClr val="tx1">
+                <a:lumMod val="50000"/>
+                <a:lumOff val="50000"/>
+              </a:schemeClr>
+            </a:solidFill>
+          </a:ln>
+          <a:extLst>
+            <a:ext uri="{909E8E84-426E-40DD-AFC4-6F175D3DCCD1}">
+              <a14:hiddenFill xmlns:a14="http://schemas.microsoft.com/office/drawing/2010/main">
+                <a:solidFill>
+                  <a:srgbClr val="FFFFFF"/>
+                </a:solidFill>
+              </a14:hiddenFill>
+            </a:ext>
+          </a:extLst>
+        </p:spPr>
+      </p:pic>
+      <p:sp>
+        <p:nvSpPr>
+          <p:cNvPr id="33" name="Rectangle 32"/>
+          <p:cNvSpPr/>
+          <p:nvPr/>
+        </p:nvSpPr>
+        <p:spPr>
+          <a:xfrm>
+            <a:off x="4825041" y="3812074"/>
+            <a:ext cx="3812875" cy="1199072"/>
+          </a:xfrm>
+          <a:prstGeom prst="rect">
+            <a:avLst/>
+          </a:prstGeom>
+          <a:noFill/>
+          <a:ln>
+            <a:solidFill>
+              <a:schemeClr val="tx1">
+                <a:lumMod val="50000"/>
+                <a:lumOff val="50000"/>
+              </a:schemeClr>
+            </a:solidFill>
+          </a:ln>
+        </p:spPr>
+        <p:style>
+          <a:lnRef idx="2">
+            <a:schemeClr val="accent1">
+              <a:shade val="50000"/>
+            </a:schemeClr>
+          </a:lnRef>
+          <a:fillRef idx="1">
+            <a:schemeClr val="accent1"/>
+          </a:fillRef>
+          <a:effectRef idx="0">
+            <a:schemeClr val="accent1"/>
+          </a:effectRef>
+          <a:fontRef idx="minor">
+            <a:schemeClr val="lt1"/>
+          </a:fontRef>
+        </p:style>
+        <p:txBody>
+          <a:bodyPr rtlCol="0" anchor="t"/>
+          <a:lstStyle/>
+          <a:p>
+            <a:r>
+              <a:rPr lang="en-US" sz="1400" dirty="0" smtClean="0">
+                <a:solidFill>
+                  <a:schemeClr val="tx1"/>
+                </a:solidFill>
+                <a:latin typeface="Segoe UI" panose="020B0502040204020203" pitchFamily="34" charset="0"/>
+                <a:cs typeface="Segoe UI" panose="020B0502040204020203" pitchFamily="34" charset="0"/>
+              </a:rPr>
+              <a:t>Georgetown Ministry Center</a:t>
+            </a:r>
+          </a:p>
+          <a:p>
+            <a:r>
+              <a:rPr lang="en-US" sz="1400" dirty="0" smtClean="0">
+                <a:solidFill>
+                  <a:schemeClr val="tx1"/>
+                </a:solidFill>
+                <a:latin typeface="Segoe UI" panose="020B0502040204020203" pitchFamily="34" charset="0"/>
+                <a:cs typeface="Segoe UI" panose="020B0502040204020203" pitchFamily="34" charset="0"/>
+              </a:rPr>
+              <a:t>Clubhouse Drop-In Center</a:t>
+            </a:r>
+            <a:endParaRPr lang="en-US" sz="1400" dirty="0" smtClean="0">
+              <a:solidFill>
+                <a:schemeClr val="tx1"/>
+              </a:solidFill>
+              <a:latin typeface="Segoe UI" panose="020B0502040204020203" pitchFamily="34" charset="0"/>
+              <a:cs typeface="Segoe UI" panose="020B0502040204020203" pitchFamily="34" charset="0"/>
+            </a:endParaRPr>
+          </a:p>
+          <a:p>
+            <a:r>
+              <a:rPr lang="en-US" sz="1100" dirty="0" smtClean="0">
+                <a:solidFill>
+                  <a:schemeClr val="tx1">
+                    <a:lumMod val="50000"/>
+                    <a:lumOff val="50000"/>
+                  </a:schemeClr>
+                </a:solidFill>
+                <a:latin typeface="Segoe UI" panose="020B0502040204020203" pitchFamily="34" charset="0"/>
+                <a:cs typeface="Segoe UI" panose="020B0502040204020203" pitchFamily="34" charset="0"/>
+              </a:rPr>
+              <a:t>1041 Wisconsin Avenue NW</a:t>
+            </a:r>
+          </a:p>
+          <a:p>
+            <a:r>
+              <a:rPr lang="en-US" sz="1100" dirty="0" smtClean="0">
+                <a:solidFill>
+                  <a:schemeClr val="tx1">
+                    <a:lumMod val="50000"/>
+                    <a:lumOff val="50000"/>
+                  </a:schemeClr>
+                </a:solidFill>
+                <a:latin typeface="Segoe UI" panose="020B0502040204020203" pitchFamily="34" charset="0"/>
+                <a:cs typeface="Segoe UI" panose="020B0502040204020203" pitchFamily="34" charset="0"/>
+              </a:rPr>
+              <a:t>Open until 4:00PM today</a:t>
+            </a:r>
+          </a:p>
+          <a:p>
+            <a:r>
+              <a:rPr lang="en-US" sz="1100" b="1" dirty="0" smtClean="0">
+                <a:solidFill>
+                  <a:schemeClr val="tx1"/>
+                </a:solidFill>
+                <a:latin typeface="Segoe UI" panose="020B0502040204020203" pitchFamily="34" charset="0"/>
+                <a:cs typeface="Segoe UI" panose="020B0502040204020203" pitchFamily="34" charset="0"/>
+              </a:rPr>
+              <a:t>Computers</a:t>
+            </a:r>
+            <a:r>
+              <a:rPr lang="en-US" sz="1100" dirty="0" smtClean="0">
+                <a:solidFill>
+                  <a:schemeClr val="tx1"/>
+                </a:solidFill>
+                <a:latin typeface="Segoe UI" panose="020B0502040204020203" pitchFamily="34" charset="0"/>
+                <a:cs typeface="Segoe UI" panose="020B0502040204020203" pitchFamily="34" charset="0"/>
+              </a:rPr>
+              <a:t> ● </a:t>
+            </a:r>
+            <a:r>
+              <a:rPr lang="en-US" sz="1100" b="1" dirty="0" smtClean="0">
+                <a:solidFill>
+                  <a:schemeClr val="tx1"/>
+                </a:solidFill>
+                <a:latin typeface="Segoe UI" panose="020B0502040204020203" pitchFamily="34" charset="0"/>
+                <a:cs typeface="Segoe UI" panose="020B0502040204020203" pitchFamily="34" charset="0"/>
+              </a:rPr>
+              <a:t>Medical Services </a:t>
+            </a:r>
+            <a:r>
+              <a:rPr lang="en-US" sz="1100" dirty="0" smtClean="0">
+                <a:solidFill>
+                  <a:schemeClr val="tx1">
+                    <a:lumMod val="50000"/>
+                    <a:lumOff val="50000"/>
+                  </a:schemeClr>
+                </a:solidFill>
+                <a:latin typeface="Segoe UI" panose="020B0502040204020203" pitchFamily="34" charset="0"/>
+                <a:cs typeface="Segoe UI" panose="020B0502040204020203" pitchFamily="34" charset="0"/>
+              </a:rPr>
+              <a:t>● </a:t>
+            </a:r>
+          </a:p>
+          <a:p>
+            <a:r>
+              <a:rPr lang="en-US" sz="1100" dirty="0" smtClean="0">
+                <a:solidFill>
+                  <a:schemeClr val="tx1">
+                    <a:lumMod val="50000"/>
+                    <a:lumOff val="50000"/>
+                  </a:schemeClr>
+                </a:solidFill>
+                <a:latin typeface="Segoe UI" panose="020B0502040204020203" pitchFamily="34" charset="0"/>
+                <a:cs typeface="Segoe UI" panose="020B0502040204020203" pitchFamily="34" charset="0"/>
+              </a:rPr>
+              <a:t>Art Therapy ● Case Management … </a:t>
+            </a:r>
+            <a:endParaRPr lang="en-US" sz="1200" dirty="0">
+              <a:solidFill>
+                <a:schemeClr val="tx1"/>
+              </a:solidFill>
+              <a:latin typeface="Segoe UI" panose="020B0502040204020203" pitchFamily="34" charset="0"/>
+              <a:cs typeface="Segoe UI" panose="020B0502040204020203" pitchFamily="34" charset="0"/>
+            </a:endParaRPr>
+          </a:p>
+        </p:txBody>
+      </p:sp>
+      <p:pic>
+        <p:nvPicPr>
+          <p:cNvPr id="1030" name="Picture 6" descr="https://www.dclibrary.org/sites/default/files/styles/huge__800_x_800_/public/DCPL%20logo_9.jpg?itok=bVzJH_Dq"/>
+          <p:cNvPicPr>
+            <a:picLocks noChangeAspect="1" noChangeArrowheads="1"/>
+          </p:cNvPicPr>
+          <p:nvPr/>
+        </p:nvPicPr>
+        <p:blipFill>
+          <a:blip r:embed="rId4" cstate="print">
+            <a:extLst>
+              <a:ext uri="{28A0092B-C50C-407E-A947-70E740481C1C}">
+                <a14:useLocalDpi xmlns:a14="http://schemas.microsoft.com/office/drawing/2010/main" val="0"/>
+              </a:ext>
+            </a:extLst>
+          </a:blip>
+          <a:srcRect/>
+          <a:stretch>
+            <a:fillRect/>
+          </a:stretch>
+        </p:blipFill>
+        <p:spPr bwMode="auto">
+          <a:xfrm>
+            <a:off x="3014931" y="5331533"/>
+            <a:ext cx="1218246" cy="870862"/>
+          </a:xfrm>
+          <a:prstGeom prst="rect">
+            <a:avLst/>
+          </a:prstGeom>
+          <a:noFill/>
+          <a:extLst>
+            <a:ext uri="{909E8E84-426E-40DD-AFC4-6F175D3DCCD1}">
+              <a14:hiddenFill xmlns:a14="http://schemas.microsoft.com/office/drawing/2010/main">
+                <a:solidFill>
+                  <a:srgbClr val="FFFFFF"/>
+                </a:solidFill>
+              </a14:hiddenFill>
+            </a:ext>
+          </a:extLst>
+        </p:spPr>
+      </p:pic>
+      <p:sp>
+        <p:nvSpPr>
+          <p:cNvPr id="7" name="Rectangle 6"/>
+          <p:cNvSpPr/>
+          <p:nvPr/>
+        </p:nvSpPr>
+        <p:spPr>
+          <a:xfrm>
+            <a:off x="3014931" y="5149969"/>
+            <a:ext cx="1218246" cy="1198267"/>
+          </a:xfrm>
+          <a:prstGeom prst="rect">
+            <a:avLst/>
+          </a:prstGeom>
+          <a:noFill/>
+          <a:ln>
+            <a:solidFill>
+              <a:schemeClr val="tx1">
+                <a:lumMod val="50000"/>
+                <a:lumOff val="50000"/>
+              </a:schemeClr>
+            </a:solidFill>
+          </a:ln>
+        </p:spPr>
+        <p:style>
+          <a:lnRef idx="2">
+            <a:schemeClr val="accent1">
+              <a:shade val="50000"/>
+            </a:schemeClr>
+          </a:lnRef>
+          <a:fillRef idx="1">
+            <a:schemeClr val="accent1"/>
+          </a:fillRef>
+          <a:effectRef idx="0">
+            <a:schemeClr val="accent1"/>
+          </a:effectRef>
+          <a:fontRef idx="minor">
+            <a:schemeClr val="lt1"/>
+          </a:fontRef>
+        </p:style>
+        <p:txBody>
+          <a:bodyPr rtlCol="0" anchor="ctr"/>
+          <a:lstStyle/>
+          <a:p>
+            <a:pPr algn="ctr"/>
+            <a:endParaRPr lang="en-US"/>
+          </a:p>
+        </p:txBody>
+      </p:sp>
+      <p:sp>
+        <p:nvSpPr>
+          <p:cNvPr id="44" name="Rectangle 43"/>
+          <p:cNvSpPr/>
+          <p:nvPr/>
+        </p:nvSpPr>
+        <p:spPr>
+          <a:xfrm>
+            <a:off x="4390845" y="1587260"/>
+            <a:ext cx="71887" cy="2311880"/>
+          </a:xfrm>
+          <a:prstGeom prst="rect">
+            <a:avLst/>
+          </a:prstGeom>
+          <a:solidFill>
+            <a:schemeClr val="tx1">
+              <a:lumMod val="50000"/>
+              <a:lumOff val="50000"/>
+            </a:schemeClr>
+          </a:solidFill>
+          <a:ln>
+            <a:noFill/>
+          </a:ln>
+        </p:spPr>
+        <p:style>
+          <a:lnRef idx="2">
+            <a:schemeClr val="accent1">
+              <a:shade val="50000"/>
+            </a:schemeClr>
+          </a:lnRef>
+          <a:fillRef idx="1">
+            <a:schemeClr val="accent1"/>
+          </a:fillRef>
+          <a:effectRef idx="0">
+            <a:schemeClr val="accent1"/>
+          </a:effectRef>
+          <a:fontRef idx="minor">
+            <a:schemeClr val="lt1"/>
+          </a:fontRef>
+        </p:style>
+        <p:txBody>
+          <a:bodyPr rtlCol="0" anchor="ctr"/>
+          <a:lstStyle/>
+          <a:p>
+            <a:pPr algn="ctr"/>
+            <a:endParaRPr lang="en-US"/>
+          </a:p>
+        </p:txBody>
+      </p:sp>
+      <p:sp>
+        <p:nvSpPr>
+          <p:cNvPr id="45" name="Rectangle 44"/>
+          <p:cNvSpPr/>
+          <p:nvPr/>
+        </p:nvSpPr>
+        <p:spPr>
+          <a:xfrm>
+            <a:off x="8795584" y="1587260"/>
+            <a:ext cx="71887" cy="5106838"/>
+          </a:xfrm>
+          <a:prstGeom prst="rect">
+            <a:avLst/>
+          </a:prstGeom>
+          <a:solidFill>
+            <a:schemeClr val="bg1">
+              <a:lumMod val="95000"/>
+            </a:schemeClr>
+          </a:solidFill>
+          <a:ln>
+            <a:noFill/>
+          </a:ln>
+        </p:spPr>
+        <p:style>
+          <a:lnRef idx="2">
+            <a:schemeClr val="accent1">
+              <a:shade val="50000"/>
+            </a:schemeClr>
+          </a:lnRef>
+          <a:fillRef idx="1">
+            <a:schemeClr val="accent1"/>
+          </a:fillRef>
+          <a:effectRef idx="0">
+            <a:schemeClr val="accent1"/>
+          </a:effectRef>
+          <a:fontRef idx="minor">
+            <a:schemeClr val="lt1"/>
+          </a:fontRef>
+        </p:style>
+        <p:txBody>
+          <a:bodyPr rtlCol="0" anchor="ctr"/>
+          <a:lstStyle/>
+          <a:p>
+            <a:pPr algn="ctr"/>
+            <a:endParaRPr lang="en-US"/>
+          </a:p>
+        </p:txBody>
+      </p:sp>
+      <p:sp>
+        <p:nvSpPr>
+          <p:cNvPr id="46" name="Rectangle 45"/>
+          <p:cNvSpPr/>
+          <p:nvPr/>
+        </p:nvSpPr>
+        <p:spPr>
+          <a:xfrm>
+            <a:off x="8795584" y="1587260"/>
+            <a:ext cx="71887" cy="1043797"/>
+          </a:xfrm>
+          <a:prstGeom prst="rect">
+            <a:avLst/>
+          </a:prstGeom>
+          <a:solidFill>
+            <a:schemeClr val="tx1">
+              <a:lumMod val="50000"/>
+              <a:lumOff val="50000"/>
+            </a:schemeClr>
+          </a:solidFill>
+          <a:ln>
+            <a:noFill/>
+          </a:ln>
+        </p:spPr>
+        <p:style>
+          <a:lnRef idx="2">
+            <a:schemeClr val="accent1">
+              <a:shade val="50000"/>
+            </a:schemeClr>
+          </a:lnRef>
+          <a:fillRef idx="1">
+            <a:schemeClr val="accent1"/>
+          </a:fillRef>
+          <a:effectRef idx="0">
+            <a:schemeClr val="accent1"/>
+          </a:effectRef>
+          <a:fontRef idx="minor">
+            <a:schemeClr val="lt1"/>
+          </a:fontRef>
+        </p:style>
+        <p:txBody>
+          <a:bodyPr rtlCol="0" anchor="ctr"/>
+          <a:lstStyle/>
+          <a:p>
+            <a:pPr algn="ctr"/>
+            <a:endParaRPr lang="en-US"/>
+          </a:p>
+        </p:txBody>
+      </p:sp>
+      <p:sp>
+        <p:nvSpPr>
+          <p:cNvPr id="48" name="Rectangle 47"/>
+          <p:cNvSpPr/>
+          <p:nvPr/>
+        </p:nvSpPr>
+        <p:spPr>
+          <a:xfrm>
+            <a:off x="420301" y="6477633"/>
+            <a:ext cx="3812875" cy="216465"/>
+          </a:xfrm>
+          <a:prstGeom prst="rect">
+            <a:avLst/>
+          </a:prstGeom>
+          <a:noFill/>
+          <a:ln>
+            <a:solidFill>
+              <a:schemeClr val="tx1">
+                <a:lumMod val="50000"/>
+                <a:lumOff val="50000"/>
+              </a:schemeClr>
+            </a:solidFill>
+          </a:ln>
+        </p:spPr>
+        <p:style>
+          <a:lnRef idx="2">
+            <a:schemeClr val="accent1">
+              <a:shade val="50000"/>
+            </a:schemeClr>
+          </a:lnRef>
+          <a:fillRef idx="1">
+            <a:schemeClr val="accent1"/>
+          </a:fillRef>
+          <a:effectRef idx="0">
+            <a:schemeClr val="accent1"/>
+          </a:effectRef>
+          <a:fontRef idx="minor">
+            <a:schemeClr val="lt1"/>
+          </a:fontRef>
+        </p:style>
+        <p:txBody>
+          <a:bodyPr rtlCol="0" anchor="t"/>
+          <a:lstStyle/>
+          <a:p>
+            <a:r>
+              <a:rPr lang="en-US" sz="1400" dirty="0" smtClean="0">
+                <a:solidFill>
+                  <a:schemeClr val="tx1"/>
+                </a:solidFill>
+                <a:latin typeface="Segoe UI" panose="020B0502040204020203" pitchFamily="34" charset="0"/>
+                <a:cs typeface="Segoe UI" panose="020B0502040204020203" pitchFamily="34" charset="0"/>
+              </a:rPr>
+              <a:t>DC Public Library</a:t>
+            </a:r>
+          </a:p>
+          <a:p>
+            <a:endParaRPr lang="en-US" sz="1200" dirty="0">
+              <a:solidFill>
+                <a:schemeClr val="tx1"/>
+              </a:solidFill>
+              <a:latin typeface="Segoe UI" panose="020B0502040204020203" pitchFamily="34" charset="0"/>
+              <a:cs typeface="Segoe UI" panose="020B0502040204020203" pitchFamily="34" charset="0"/>
+            </a:endParaRPr>
+          </a:p>
+        </p:txBody>
+      </p:sp>
+      <p:sp>
+        <p:nvSpPr>
+          <p:cNvPr id="49" name="Rectangle 48"/>
+          <p:cNvSpPr/>
+          <p:nvPr/>
+        </p:nvSpPr>
+        <p:spPr>
+          <a:xfrm>
+            <a:off x="3014930" y="6476828"/>
+            <a:ext cx="1218246" cy="217270"/>
+          </a:xfrm>
+          <a:prstGeom prst="rect">
+            <a:avLst/>
+          </a:prstGeom>
+          <a:noFill/>
+          <a:ln>
+            <a:solidFill>
+              <a:schemeClr val="tx1">
+                <a:lumMod val="50000"/>
+                <a:lumOff val="50000"/>
+              </a:schemeClr>
+            </a:solidFill>
+          </a:ln>
+        </p:spPr>
+        <p:style>
+          <a:lnRef idx="2">
+            <a:schemeClr val="accent1">
+              <a:shade val="50000"/>
+            </a:schemeClr>
+          </a:lnRef>
+          <a:fillRef idx="1">
+            <a:schemeClr val="accent1"/>
+          </a:fillRef>
+          <a:effectRef idx="0">
+            <a:schemeClr val="accent1"/>
+          </a:effectRef>
+          <a:fontRef idx="minor">
+            <a:schemeClr val="lt1"/>
+          </a:fontRef>
+        </p:style>
+        <p:txBody>
+          <a:bodyPr rtlCol="0" anchor="ctr"/>
+          <a:lstStyle/>
+          <a:p>
+            <a:pPr algn="ctr"/>
+            <a:endParaRPr lang="en-US"/>
+          </a:p>
+        </p:txBody>
+      </p:sp>
+      <p:sp>
+        <p:nvSpPr>
+          <p:cNvPr id="50" name="Rectangle 49"/>
+          <p:cNvSpPr/>
+          <p:nvPr/>
+        </p:nvSpPr>
+        <p:spPr>
+          <a:xfrm>
+            <a:off x="4825042" y="5149969"/>
+            <a:ext cx="3812875" cy="1199072"/>
+          </a:xfrm>
+          <a:prstGeom prst="rect">
+            <a:avLst/>
+          </a:prstGeom>
+          <a:noFill/>
+          <a:ln>
+            <a:solidFill>
+              <a:schemeClr val="tx1">
+                <a:lumMod val="50000"/>
+                <a:lumOff val="50000"/>
+              </a:schemeClr>
+            </a:solidFill>
+          </a:ln>
+        </p:spPr>
+        <p:style>
+          <a:lnRef idx="2">
+            <a:schemeClr val="accent1">
+              <a:shade val="50000"/>
+            </a:schemeClr>
+          </a:lnRef>
+          <a:fillRef idx="1">
+            <a:schemeClr val="accent1"/>
+          </a:fillRef>
+          <a:effectRef idx="0">
+            <a:schemeClr val="accent1"/>
+          </a:effectRef>
+          <a:fontRef idx="minor">
+            <a:schemeClr val="lt1"/>
+          </a:fontRef>
+        </p:style>
+        <p:txBody>
+          <a:bodyPr rtlCol="0" anchor="t"/>
+          <a:lstStyle/>
+          <a:p>
+            <a:r>
+              <a:rPr lang="en-US" sz="1400" dirty="0" smtClean="0">
+                <a:solidFill>
+                  <a:schemeClr val="tx1"/>
+                </a:solidFill>
+                <a:latin typeface="Segoe UI" panose="020B0502040204020203" pitchFamily="34" charset="0"/>
+                <a:cs typeface="Segoe UI" panose="020B0502040204020203" pitchFamily="34" charset="0"/>
+              </a:rPr>
+              <a:t>Bread for the City</a:t>
+            </a:r>
+          </a:p>
+          <a:p>
+            <a:r>
+              <a:rPr lang="en-US" sz="1400" dirty="0" smtClean="0">
+                <a:solidFill>
+                  <a:schemeClr val="tx1"/>
+                </a:solidFill>
+                <a:latin typeface="Segoe UI" panose="020B0502040204020203" pitchFamily="34" charset="0"/>
+                <a:cs typeface="Segoe UI" panose="020B0502040204020203" pitchFamily="34" charset="0"/>
+              </a:rPr>
+              <a:t>Northwest Center</a:t>
+            </a:r>
+          </a:p>
+          <a:p>
+            <a:r>
+              <a:rPr lang="en-US" sz="1100" dirty="0" smtClean="0">
+                <a:solidFill>
+                  <a:schemeClr val="tx1">
+                    <a:lumMod val="50000"/>
+                    <a:lumOff val="50000"/>
+                  </a:schemeClr>
+                </a:solidFill>
+                <a:latin typeface="Segoe UI" panose="020B0502040204020203" pitchFamily="34" charset="0"/>
+                <a:cs typeface="Segoe UI" panose="020B0502040204020203" pitchFamily="34" charset="0"/>
+              </a:rPr>
+              <a:t>1525 7</a:t>
+            </a:r>
+            <a:r>
+              <a:rPr lang="en-US" sz="1100" baseline="30000" dirty="0" smtClean="0">
+                <a:solidFill>
+                  <a:schemeClr val="tx1">
+                    <a:lumMod val="50000"/>
+                    <a:lumOff val="50000"/>
+                  </a:schemeClr>
+                </a:solidFill>
+                <a:latin typeface="Segoe UI" panose="020B0502040204020203" pitchFamily="34" charset="0"/>
+                <a:cs typeface="Segoe UI" panose="020B0502040204020203" pitchFamily="34" charset="0"/>
+              </a:rPr>
+              <a:t>th</a:t>
+            </a:r>
+            <a:r>
+              <a:rPr lang="en-US" sz="1100" dirty="0" smtClean="0">
+                <a:solidFill>
+                  <a:schemeClr val="tx1">
+                    <a:lumMod val="50000"/>
+                    <a:lumOff val="50000"/>
+                  </a:schemeClr>
+                </a:solidFill>
+                <a:latin typeface="Segoe UI" panose="020B0502040204020203" pitchFamily="34" charset="0"/>
+                <a:cs typeface="Segoe UI" panose="020B0502040204020203" pitchFamily="34" charset="0"/>
+              </a:rPr>
+              <a:t> Street NW</a:t>
+            </a:r>
+          </a:p>
+          <a:p>
+            <a:r>
+              <a:rPr lang="en-US" sz="1100" dirty="0" smtClean="0">
+                <a:solidFill>
+                  <a:schemeClr val="tx1">
+                    <a:lumMod val="50000"/>
+                    <a:lumOff val="50000"/>
+                  </a:schemeClr>
+                </a:solidFill>
+                <a:latin typeface="Segoe UI" panose="020B0502040204020203" pitchFamily="34" charset="0"/>
+                <a:cs typeface="Segoe UI" panose="020B0502040204020203" pitchFamily="34" charset="0"/>
+              </a:rPr>
+              <a:t>Open until 5:00PM today</a:t>
+            </a:r>
+          </a:p>
+          <a:p>
+            <a:r>
+              <a:rPr lang="en-US" sz="1100" b="1" dirty="0" smtClean="0">
+                <a:solidFill>
+                  <a:schemeClr val="tx1"/>
+                </a:solidFill>
+                <a:latin typeface="Segoe UI" panose="020B0502040204020203" pitchFamily="34" charset="0"/>
+                <a:cs typeface="Segoe UI" panose="020B0502040204020203" pitchFamily="34" charset="0"/>
+              </a:rPr>
+              <a:t>Medical Services </a:t>
+            </a:r>
+            <a:r>
+              <a:rPr lang="en-US" sz="1100" dirty="0" smtClean="0">
+                <a:solidFill>
+                  <a:schemeClr val="tx1"/>
+                </a:solidFill>
+                <a:latin typeface="Segoe UI" panose="020B0502040204020203" pitchFamily="34" charset="0"/>
+                <a:cs typeface="Segoe UI" panose="020B0502040204020203" pitchFamily="34" charset="0"/>
+              </a:rPr>
+              <a:t>● </a:t>
+            </a:r>
+            <a:r>
+              <a:rPr lang="en-US" sz="1100" dirty="0" smtClean="0">
+                <a:solidFill>
+                  <a:schemeClr val="tx1">
+                    <a:lumMod val="50000"/>
+                    <a:lumOff val="50000"/>
+                  </a:schemeClr>
+                </a:solidFill>
+                <a:latin typeface="Segoe UI" panose="020B0502040204020203" pitchFamily="34" charset="0"/>
+                <a:cs typeface="Segoe UI" panose="020B0502040204020203" pitchFamily="34" charset="0"/>
+              </a:rPr>
+              <a:t>Case </a:t>
+            </a:r>
+          </a:p>
+          <a:p>
+            <a:r>
+              <a:rPr lang="en-US" sz="1100" dirty="0" smtClean="0">
+                <a:solidFill>
+                  <a:schemeClr val="tx1">
+                    <a:lumMod val="50000"/>
+                    <a:lumOff val="50000"/>
+                  </a:schemeClr>
+                </a:solidFill>
+                <a:latin typeface="Segoe UI" panose="020B0502040204020203" pitchFamily="34" charset="0"/>
+                <a:cs typeface="Segoe UI" panose="020B0502040204020203" pitchFamily="34" charset="0"/>
+              </a:rPr>
+              <a:t>Management </a:t>
+            </a:r>
+            <a:r>
+              <a:rPr lang="en-US" sz="1100" dirty="0" smtClean="0">
+                <a:solidFill>
+                  <a:schemeClr val="tx1">
+                    <a:lumMod val="50000"/>
+                    <a:lumOff val="50000"/>
+                  </a:schemeClr>
+                </a:solidFill>
+                <a:latin typeface="Segoe UI" panose="020B0502040204020203" pitchFamily="34" charset="0"/>
+                <a:cs typeface="Segoe UI" panose="020B0502040204020203" pitchFamily="34" charset="0"/>
+              </a:rPr>
+              <a:t>● </a:t>
+            </a:r>
+            <a:r>
+              <a:rPr lang="en-US" sz="1100" dirty="0" smtClean="0">
+                <a:solidFill>
+                  <a:schemeClr val="tx1">
+                    <a:lumMod val="50000"/>
+                    <a:lumOff val="50000"/>
+                  </a:schemeClr>
+                </a:solidFill>
+                <a:latin typeface="Segoe UI" panose="020B0502040204020203" pitchFamily="34" charset="0"/>
+                <a:cs typeface="Segoe UI" panose="020B0502040204020203" pitchFamily="34" charset="0"/>
+              </a:rPr>
+              <a:t>Dental Services …</a:t>
+            </a:r>
+            <a:endParaRPr lang="en-US" sz="1200" dirty="0">
+              <a:solidFill>
+                <a:schemeClr val="tx1"/>
+              </a:solidFill>
+              <a:latin typeface="Segoe UI" panose="020B0502040204020203" pitchFamily="34" charset="0"/>
+              <a:cs typeface="Segoe UI" panose="020B0502040204020203" pitchFamily="34" charset="0"/>
+            </a:endParaRPr>
+          </a:p>
+        </p:txBody>
+      </p:sp>
+      <p:sp>
+        <p:nvSpPr>
+          <p:cNvPr id="53" name="Rectangle 52"/>
+          <p:cNvSpPr/>
+          <p:nvPr/>
+        </p:nvSpPr>
+        <p:spPr>
+          <a:xfrm>
+            <a:off x="4825041" y="6477633"/>
+            <a:ext cx="3812875" cy="216465"/>
+          </a:xfrm>
+          <a:prstGeom prst="rect">
+            <a:avLst/>
+          </a:prstGeom>
+          <a:noFill/>
+          <a:ln>
+            <a:solidFill>
+              <a:schemeClr val="tx1">
+                <a:lumMod val="50000"/>
+                <a:lumOff val="50000"/>
+              </a:schemeClr>
+            </a:solidFill>
+          </a:ln>
+        </p:spPr>
+        <p:style>
+          <a:lnRef idx="2">
+            <a:schemeClr val="accent1">
+              <a:shade val="50000"/>
+            </a:schemeClr>
+          </a:lnRef>
+          <a:fillRef idx="1">
+            <a:schemeClr val="accent1"/>
+          </a:fillRef>
+          <a:effectRef idx="0">
+            <a:schemeClr val="accent1"/>
+          </a:effectRef>
+          <a:fontRef idx="minor">
+            <a:schemeClr val="lt1"/>
+          </a:fontRef>
+        </p:style>
+        <p:txBody>
+          <a:bodyPr rtlCol="0" anchor="t"/>
+          <a:lstStyle/>
+          <a:p>
+            <a:r>
+              <a:rPr lang="en-US" sz="1400" dirty="0" smtClean="0">
+                <a:solidFill>
+                  <a:schemeClr val="tx1"/>
+                </a:solidFill>
+                <a:latin typeface="Segoe UI" panose="020B0502040204020203" pitchFamily="34" charset="0"/>
+                <a:cs typeface="Segoe UI" panose="020B0502040204020203" pitchFamily="34" charset="0"/>
+              </a:rPr>
+              <a:t>Department of Human Services</a:t>
+            </a:r>
+          </a:p>
+          <a:p>
+            <a:endParaRPr lang="en-US" sz="1200" dirty="0">
+              <a:solidFill>
+                <a:schemeClr val="tx1"/>
+              </a:solidFill>
+              <a:latin typeface="Segoe UI" panose="020B0502040204020203" pitchFamily="34" charset="0"/>
+              <a:cs typeface="Segoe UI" panose="020B0502040204020203" pitchFamily="34" charset="0"/>
+            </a:endParaRPr>
+          </a:p>
+        </p:txBody>
+      </p:sp>
+      <p:sp>
+        <p:nvSpPr>
+          <p:cNvPr id="54" name="Rectangle 53"/>
+          <p:cNvSpPr/>
+          <p:nvPr/>
+        </p:nvSpPr>
+        <p:spPr>
+          <a:xfrm>
+            <a:off x="7419670" y="6476828"/>
+            <a:ext cx="1218246" cy="217270"/>
+          </a:xfrm>
+          <a:prstGeom prst="rect">
+            <a:avLst/>
+          </a:prstGeom>
+          <a:noFill/>
+          <a:ln>
+            <a:solidFill>
+              <a:schemeClr val="tx1">
+                <a:lumMod val="50000"/>
+                <a:lumOff val="50000"/>
+              </a:schemeClr>
+            </a:solidFill>
+          </a:ln>
+        </p:spPr>
+        <p:style>
+          <a:lnRef idx="2">
+            <a:schemeClr val="accent1">
+              <a:shade val="50000"/>
+            </a:schemeClr>
+          </a:lnRef>
+          <a:fillRef idx="1">
+            <a:schemeClr val="accent1"/>
+          </a:fillRef>
+          <a:effectRef idx="0">
+            <a:schemeClr val="accent1"/>
+          </a:effectRef>
+          <a:fontRef idx="minor">
+            <a:schemeClr val="lt1"/>
+          </a:fontRef>
+        </p:style>
+        <p:txBody>
+          <a:bodyPr rtlCol="0" anchor="ctr"/>
+          <a:lstStyle/>
+          <a:p>
+            <a:pPr algn="ctr"/>
+            <a:endParaRPr lang="en-US"/>
+          </a:p>
+        </p:txBody>
+      </p:sp>
+      <p:sp>
+        <p:nvSpPr>
+          <p:cNvPr id="42" name="TextBox 41"/>
+          <p:cNvSpPr txBox="1"/>
+          <p:nvPr/>
+        </p:nvSpPr>
+        <p:spPr>
+          <a:xfrm>
+            <a:off x="420301" y="1886367"/>
+            <a:ext cx="3247845" cy="430887"/>
+          </a:xfrm>
+          <a:prstGeom prst="rect">
+            <a:avLst/>
+          </a:prstGeom>
+          <a:noFill/>
         </p:spPr>
         <p:txBody>
           <a:bodyPr wrap="square" rtlCol="0">
@@ -4071,21 +5983,323 @@
           <a:lstStyle/>
           <a:p>
             <a:r>
-              <a:rPr lang="en-US" dirty="0" smtClean="0">
-                <a:solidFill>
-                  <a:srgbClr val="FF0000"/>
-                </a:solidFill>
-              </a:rPr>
-              <a:t>Page 3: Option 1</a:t>
-            </a:r>
-            <a:endParaRPr lang="en-US" dirty="0">
-              <a:solidFill>
-                <a:srgbClr val="FF0000"/>
-              </a:solidFill>
+              <a:rPr lang="en-US" sz="1100" dirty="0" smtClean="0">
+                <a:latin typeface="Segoe UI" panose="020B0502040204020203" pitchFamily="34" charset="0"/>
+                <a:cs typeface="Segoe UI" panose="020B0502040204020203" pitchFamily="34" charset="0"/>
+              </a:rPr>
+              <a:t>You need:</a:t>
+            </a:r>
+          </a:p>
+          <a:p>
+            <a:r>
+              <a:rPr lang="en-US" sz="1100" b="1" dirty="0" smtClean="0">
+                <a:latin typeface="Segoe UI" panose="020B0502040204020203" pitchFamily="34" charset="0"/>
+                <a:cs typeface="Segoe UI" panose="020B0502040204020203" pitchFamily="34" charset="0"/>
+              </a:rPr>
+              <a:t>Computers </a:t>
+            </a:r>
+            <a:r>
+              <a:rPr lang="en-US" sz="1100" dirty="0" smtClean="0">
+                <a:solidFill>
+                  <a:schemeClr val="tx1"/>
+                </a:solidFill>
+                <a:latin typeface="Segoe UI" panose="020B0502040204020203" pitchFamily="34" charset="0"/>
+                <a:cs typeface="Segoe UI" panose="020B0502040204020203" pitchFamily="34" charset="0"/>
+              </a:rPr>
+              <a:t>● </a:t>
+            </a:r>
+            <a:r>
+              <a:rPr lang="en-US" sz="1100" b="1" dirty="0" smtClean="0">
+                <a:latin typeface="Segoe UI" panose="020B0502040204020203" pitchFamily="34" charset="0"/>
+                <a:cs typeface="Segoe UI" panose="020B0502040204020203" pitchFamily="34" charset="0"/>
+              </a:rPr>
+              <a:t>Adult Literacy</a:t>
+            </a:r>
+            <a:endParaRPr lang="en-US" sz="1100" b="1" dirty="0">
+              <a:latin typeface="Segoe UI" panose="020B0502040204020203" pitchFamily="34" charset="0"/>
+              <a:cs typeface="Segoe UI" panose="020B0502040204020203" pitchFamily="34" charset="0"/>
             </a:endParaRPr>
           </a:p>
         </p:txBody>
       </p:sp>
+      <p:sp>
+        <p:nvSpPr>
+          <p:cNvPr id="56" name="TextBox 55"/>
+          <p:cNvSpPr txBox="1"/>
+          <p:nvPr/>
+        </p:nvSpPr>
+        <p:spPr>
+          <a:xfrm>
+            <a:off x="4825041" y="1934374"/>
+            <a:ext cx="3247845" cy="430887"/>
+          </a:xfrm>
+          <a:prstGeom prst="rect">
+            <a:avLst/>
+          </a:prstGeom>
+          <a:noFill/>
+        </p:spPr>
+        <p:txBody>
+          <a:bodyPr wrap="square" rtlCol="0">
+            <a:spAutoFit/>
+          </a:bodyPr>
+          <a:lstStyle/>
+          <a:p>
+            <a:r>
+              <a:rPr lang="en-US" sz="1100" dirty="0" smtClean="0">
+                <a:latin typeface="Segoe UI" panose="020B0502040204020203" pitchFamily="34" charset="0"/>
+                <a:cs typeface="Segoe UI" panose="020B0502040204020203" pitchFamily="34" charset="0"/>
+              </a:rPr>
+              <a:t>You need:</a:t>
+            </a:r>
+          </a:p>
+          <a:p>
+            <a:r>
+              <a:rPr lang="en-US" sz="1100" b="1" dirty="0" smtClean="0">
+                <a:latin typeface="Segoe UI" panose="020B0502040204020203" pitchFamily="34" charset="0"/>
+                <a:cs typeface="Segoe UI" panose="020B0502040204020203" pitchFamily="34" charset="0"/>
+              </a:rPr>
+              <a:t>Medical Services</a:t>
+            </a:r>
+            <a:endParaRPr lang="en-US" sz="1100" b="1" dirty="0">
+              <a:latin typeface="Segoe UI" panose="020B0502040204020203" pitchFamily="34" charset="0"/>
+              <a:cs typeface="Segoe UI" panose="020B0502040204020203" pitchFamily="34" charset="0"/>
+            </a:endParaRPr>
+          </a:p>
+        </p:txBody>
+      </p:sp>
+      <p:sp>
+        <p:nvSpPr>
+          <p:cNvPr id="43" name="Rectangle 42"/>
+          <p:cNvSpPr/>
+          <p:nvPr/>
+        </p:nvSpPr>
+        <p:spPr>
+          <a:xfrm>
+            <a:off x="420301" y="6711351"/>
+            <a:ext cx="3812875" cy="110534"/>
+          </a:xfrm>
+          <a:prstGeom prst="rect">
+            <a:avLst/>
+          </a:prstGeom>
+          <a:solidFill>
+            <a:schemeClr val="bg1"/>
+          </a:solidFill>
+          <a:ln>
+            <a:solidFill>
+              <a:schemeClr val="bg1"/>
+            </a:solidFill>
+          </a:ln>
+        </p:spPr>
+        <p:style>
+          <a:lnRef idx="2">
+            <a:schemeClr val="accent1">
+              <a:shade val="50000"/>
+            </a:schemeClr>
+          </a:lnRef>
+          <a:fillRef idx="1">
+            <a:schemeClr val="accent1"/>
+          </a:fillRef>
+          <a:effectRef idx="0">
+            <a:schemeClr val="accent1"/>
+          </a:effectRef>
+          <a:fontRef idx="minor">
+            <a:schemeClr val="lt1"/>
+          </a:fontRef>
+        </p:style>
+        <p:txBody>
+          <a:bodyPr rtlCol="0" anchor="ctr"/>
+          <a:lstStyle/>
+          <a:p>
+            <a:pPr algn="ctr"/>
+            <a:endParaRPr lang="en-US"/>
+          </a:p>
+        </p:txBody>
+      </p:sp>
+      <p:sp>
+        <p:nvSpPr>
+          <p:cNvPr id="58" name="Rectangle 57"/>
+          <p:cNvSpPr/>
+          <p:nvPr/>
+        </p:nvSpPr>
+        <p:spPr>
+          <a:xfrm>
+            <a:off x="4982709" y="6700825"/>
+            <a:ext cx="3812875" cy="110534"/>
+          </a:xfrm>
+          <a:prstGeom prst="rect">
+            <a:avLst/>
+          </a:prstGeom>
+          <a:solidFill>
+            <a:schemeClr val="bg1"/>
+          </a:solidFill>
+          <a:ln>
+            <a:solidFill>
+              <a:schemeClr val="bg1"/>
+            </a:solidFill>
+          </a:ln>
+        </p:spPr>
+        <p:style>
+          <a:lnRef idx="2">
+            <a:schemeClr val="accent1">
+              <a:shade val="50000"/>
+            </a:schemeClr>
+          </a:lnRef>
+          <a:fillRef idx="1">
+            <a:schemeClr val="accent1"/>
+          </a:fillRef>
+          <a:effectRef idx="0">
+            <a:schemeClr val="accent1"/>
+          </a:effectRef>
+          <a:fontRef idx="minor">
+            <a:schemeClr val="lt1"/>
+          </a:fontRef>
+        </p:style>
+        <p:txBody>
+          <a:bodyPr rtlCol="0" anchor="ctr"/>
+          <a:lstStyle/>
+          <a:p>
+            <a:pPr algn="ctr"/>
+            <a:endParaRPr lang="en-US"/>
+          </a:p>
+        </p:txBody>
+      </p:sp>
+      <p:pic>
+        <p:nvPicPr>
+          <p:cNvPr id="1032" name="Picture 8" descr="https://www.enr.com/images/2011/11/ENR_SE1107_SP1.jpg"/>
+          <p:cNvPicPr>
+            <a:picLocks noChangeAspect="1" noChangeArrowheads="1"/>
+          </p:cNvPicPr>
+          <p:nvPr/>
+        </p:nvPicPr>
+        <p:blipFill>
+          <a:blip r:embed="rId5">
+            <a:extLst>
+              <a:ext uri="{28A0092B-C50C-407E-A947-70E740481C1C}">
+                <a14:useLocalDpi xmlns:a14="http://schemas.microsoft.com/office/drawing/2010/main" val="0"/>
+              </a:ext>
+            </a:extLst>
+          </a:blip>
+          <a:srcRect/>
+          <a:stretch>
+            <a:fillRect/>
+          </a:stretch>
+        </p:blipFill>
+        <p:spPr bwMode="auto">
+          <a:xfrm>
+            <a:off x="7418231" y="5149969"/>
+            <a:ext cx="1218246" cy="1199071"/>
+          </a:xfrm>
+          <a:prstGeom prst="rect">
+            <a:avLst/>
+          </a:prstGeom>
+          <a:noFill/>
+          <a:extLst>
+            <a:ext uri="{909E8E84-426E-40DD-AFC4-6F175D3DCCD1}">
+              <a14:hiddenFill xmlns:a14="http://schemas.microsoft.com/office/drawing/2010/main">
+                <a:solidFill>
+                  <a:srgbClr val="FFFFFF"/>
+                </a:solidFill>
+              </a14:hiddenFill>
+            </a:ext>
+          </a:extLst>
+        </p:spPr>
+      </p:pic>
+      <p:pic>
+        <p:nvPicPr>
+          <p:cNvPr id="60" name="Picture 4" descr="GMCFrontDoor"/>
+          <p:cNvPicPr>
+            <a:picLocks noChangeAspect="1" noChangeArrowheads="1"/>
+          </p:cNvPicPr>
+          <p:nvPr/>
+        </p:nvPicPr>
+        <p:blipFill>
+          <a:blip r:embed="rId3" cstate="print">
+            <a:extLst>
+              <a:ext uri="{28A0092B-C50C-407E-A947-70E740481C1C}">
+                <a14:useLocalDpi xmlns:a14="http://schemas.microsoft.com/office/drawing/2010/main" val="0"/>
+              </a:ext>
+            </a:extLst>
+          </a:blip>
+          <a:srcRect/>
+          <a:stretch>
+            <a:fillRect/>
+          </a:stretch>
+        </p:blipFill>
+        <p:spPr bwMode="auto">
+          <a:xfrm>
+            <a:off x="7418230" y="3822313"/>
+            <a:ext cx="1218247" cy="1199072"/>
+          </a:xfrm>
+          <a:prstGeom prst="rect">
+            <a:avLst/>
+          </a:prstGeom>
+          <a:noFill/>
+          <a:ln>
+            <a:solidFill>
+              <a:schemeClr val="tx1">
+                <a:lumMod val="50000"/>
+                <a:lumOff val="50000"/>
+              </a:schemeClr>
+            </a:solidFill>
+          </a:ln>
+          <a:extLst>
+            <a:ext uri="{909E8E84-426E-40DD-AFC4-6F175D3DCCD1}">
+              <a14:hiddenFill xmlns:a14="http://schemas.microsoft.com/office/drawing/2010/main">
+                <a:solidFill>
+                  <a:srgbClr val="FFFFFF"/>
+                </a:solidFill>
+              </a14:hiddenFill>
+            </a:ext>
+          </a:extLst>
+        </p:spPr>
+      </p:pic>
+      <p:pic>
+        <p:nvPicPr>
+          <p:cNvPr id="1034" name="Picture 10" descr="https://dhs.dc.gov/sites/default/files/styles/callout_interior_graphic/public/dc/sites/dhs/agency_content/images/DCDHS_logo_CMYK.jpg?itok=wbPXGfh5"/>
+          <p:cNvPicPr>
+            <a:picLocks noChangeAspect="1" noChangeArrowheads="1"/>
+          </p:cNvPicPr>
+          <p:nvPr/>
+        </p:nvPicPr>
+        <p:blipFill rotWithShape="1">
+          <a:blip r:embed="rId6">
+            <a:extLst>
+              <a:ext uri="{28A0092B-C50C-407E-A947-70E740481C1C}">
+                <a14:useLocalDpi xmlns:a14="http://schemas.microsoft.com/office/drawing/2010/main" val="0"/>
+              </a:ext>
+            </a:extLst>
+          </a:blip>
+          <a:srcRect b="86050"/>
+          <a:stretch/>
+        </p:blipFill>
+        <p:spPr bwMode="auto">
+          <a:xfrm>
+            <a:off x="7418230" y="6487864"/>
+            <a:ext cx="1218247" cy="206234"/>
+          </a:xfrm>
+          <a:prstGeom prst="rect">
+            <a:avLst/>
+          </a:prstGeom>
+          <a:noFill/>
+          <a:ln>
+            <a:solidFill>
+              <a:schemeClr val="tx1">
+                <a:lumMod val="50000"/>
+                <a:lumOff val="50000"/>
+              </a:schemeClr>
+            </a:solidFill>
+          </a:ln>
+          <a:extLst>
+            <a:ext uri="{909E8E84-426E-40DD-AFC4-6F175D3DCCD1}">
+              <a14:hiddenFill xmlns:a14="http://schemas.microsoft.com/office/drawing/2010/main">
+                <a:solidFill>
+                  <a:srgbClr val="FFFFFF"/>
+                </a:solidFill>
+              </a14:hiddenFill>
+            </a:ext>
+          </a:extLst>
+        </p:spPr>
+      </p:pic>
     </p:spTree>
     <p:extLst>
       <p:ext uri="{BB962C8B-B14F-4D97-AF65-F5344CB8AC3E}">
@@ -4988,16 +7202,253 @@
           </a:p>
         </p:txBody>
       </p:sp>
+      <p:sp>
+        <p:nvSpPr>
+          <p:cNvPr id="29" name="Rectangle 28"/>
+          <p:cNvSpPr/>
+          <p:nvPr/>
+        </p:nvSpPr>
+        <p:spPr>
+          <a:xfrm>
+            <a:off x="3180271" y="3200396"/>
+            <a:ext cx="2725947" cy="1138687"/>
+          </a:xfrm>
+          <a:prstGeom prst="rect">
+            <a:avLst/>
+          </a:prstGeom>
+          <a:noFill/>
+          <a:ln>
+            <a:solidFill>
+              <a:schemeClr val="tx1">
+                <a:lumMod val="50000"/>
+                <a:lumOff val="50000"/>
+              </a:schemeClr>
+            </a:solidFill>
+          </a:ln>
+        </p:spPr>
+        <p:style>
+          <a:lnRef idx="2">
+            <a:schemeClr val="accent1">
+              <a:shade val="50000"/>
+            </a:schemeClr>
+          </a:lnRef>
+          <a:fillRef idx="1">
+            <a:schemeClr val="accent1"/>
+          </a:fillRef>
+          <a:effectRef idx="0">
+            <a:schemeClr val="accent1"/>
+          </a:effectRef>
+          <a:fontRef idx="minor">
+            <a:schemeClr val="lt1"/>
+          </a:fontRef>
+        </p:style>
+        <p:txBody>
+          <a:bodyPr rtlCol="0" anchor="ctr"/>
+          <a:lstStyle/>
+          <a:p>
+            <a:pPr algn="ctr"/>
+            <a:r>
+              <a:rPr lang="en-US" sz="2400" dirty="0" smtClean="0">
+                <a:solidFill>
+                  <a:schemeClr val="tx1"/>
+                </a:solidFill>
+                <a:latin typeface="Segoe UI" panose="020B0502040204020203" pitchFamily="34" charset="0"/>
+                <a:cs typeface="Segoe UI" panose="020B0502040204020203" pitchFamily="34" charset="0"/>
+              </a:rPr>
+              <a:t>Physical &amp; Mental Health</a:t>
+            </a:r>
+            <a:endParaRPr lang="en-US" sz="2400" dirty="0">
+              <a:solidFill>
+                <a:schemeClr val="tx1"/>
+              </a:solidFill>
+              <a:latin typeface="Segoe UI" panose="020B0502040204020203" pitchFamily="34" charset="0"/>
+              <a:cs typeface="Segoe UI" panose="020B0502040204020203" pitchFamily="34" charset="0"/>
+            </a:endParaRPr>
+          </a:p>
+        </p:txBody>
+      </p:sp>
+      <p:sp>
+        <p:nvSpPr>
+          <p:cNvPr id="33" name="Rectangle 32"/>
+          <p:cNvSpPr/>
+          <p:nvPr/>
+        </p:nvSpPr>
+        <p:spPr>
+          <a:xfrm>
+            <a:off x="7090913" y="6193071"/>
+            <a:ext cx="854015" cy="319178"/>
+          </a:xfrm>
+          <a:prstGeom prst="rect">
+            <a:avLst/>
+          </a:prstGeom>
+          <a:solidFill>
+            <a:schemeClr val="bg2">
+              <a:lumMod val="90000"/>
+            </a:schemeClr>
+          </a:solidFill>
+          <a:ln>
+            <a:solidFill>
+              <a:schemeClr val="tx1">
+                <a:lumMod val="50000"/>
+                <a:lumOff val="50000"/>
+              </a:schemeClr>
+            </a:solidFill>
+          </a:ln>
+        </p:spPr>
+        <p:style>
+          <a:lnRef idx="2">
+            <a:schemeClr val="accent1">
+              <a:shade val="50000"/>
+            </a:schemeClr>
+          </a:lnRef>
+          <a:fillRef idx="1">
+            <a:schemeClr val="accent1"/>
+          </a:fillRef>
+          <a:effectRef idx="0">
+            <a:schemeClr val="accent1"/>
+          </a:effectRef>
+          <a:fontRef idx="minor">
+            <a:schemeClr val="lt1"/>
+          </a:fontRef>
+        </p:style>
+        <p:txBody>
+          <a:bodyPr rtlCol="0" anchor="ctr"/>
+          <a:lstStyle/>
+          <a:p>
+            <a:pPr algn="ctr"/>
+            <a:r>
+              <a:rPr lang="en-US" sz="1600" dirty="0" smtClean="0">
+                <a:solidFill>
+                  <a:schemeClr val="tx1"/>
+                </a:solidFill>
+                <a:latin typeface="Segoe UI" panose="020B0502040204020203" pitchFamily="34" charset="0"/>
+                <a:cs typeface="Segoe UI" panose="020B0502040204020203" pitchFamily="34" charset="0"/>
+              </a:rPr>
+              <a:t>Submit</a:t>
+            </a:r>
+            <a:endParaRPr lang="en-US" sz="1600" dirty="0">
+              <a:solidFill>
+                <a:schemeClr val="tx1"/>
+              </a:solidFill>
+              <a:latin typeface="Segoe UI" panose="020B0502040204020203" pitchFamily="34" charset="0"/>
+              <a:cs typeface="Segoe UI" panose="020B0502040204020203" pitchFamily="34" charset="0"/>
+            </a:endParaRPr>
+          </a:p>
+        </p:txBody>
+      </p:sp>
+      <p:sp>
+        <p:nvSpPr>
+          <p:cNvPr id="34" name="Rectangle 33"/>
+          <p:cNvSpPr/>
+          <p:nvPr/>
+        </p:nvSpPr>
+        <p:spPr>
+          <a:xfrm>
+            <a:off x="6081622" y="3200396"/>
+            <a:ext cx="2725947" cy="1138687"/>
+          </a:xfrm>
+          <a:prstGeom prst="rect">
+            <a:avLst/>
+          </a:prstGeom>
+          <a:noFill/>
+          <a:ln>
+            <a:solidFill>
+              <a:schemeClr val="tx1">
+                <a:lumMod val="50000"/>
+                <a:lumOff val="50000"/>
+              </a:schemeClr>
+            </a:solidFill>
+          </a:ln>
+        </p:spPr>
+        <p:style>
+          <a:lnRef idx="2">
+            <a:schemeClr val="accent1">
+              <a:shade val="50000"/>
+            </a:schemeClr>
+          </a:lnRef>
+          <a:fillRef idx="1">
+            <a:schemeClr val="accent1"/>
+          </a:fillRef>
+          <a:effectRef idx="0">
+            <a:schemeClr val="accent1"/>
+          </a:effectRef>
+          <a:fontRef idx="minor">
+            <a:schemeClr val="lt1"/>
+          </a:fontRef>
+        </p:style>
+        <p:txBody>
+          <a:bodyPr rtlCol="0" anchor="ctr"/>
+          <a:lstStyle/>
+          <a:p>
+            <a:pPr algn="ctr"/>
+            <a:r>
+              <a:rPr lang="en-US" sz="2400" dirty="0" smtClean="0">
+                <a:solidFill>
+                  <a:schemeClr val="tx1"/>
+                </a:solidFill>
+                <a:latin typeface="Segoe UI" panose="020B0502040204020203" pitchFamily="34" charset="0"/>
+                <a:cs typeface="Segoe UI" panose="020B0502040204020203" pitchFamily="34" charset="0"/>
+              </a:rPr>
+              <a:t>Housing</a:t>
+            </a:r>
+            <a:endParaRPr lang="en-US" sz="2400" dirty="0">
+              <a:solidFill>
+                <a:schemeClr val="tx1"/>
+              </a:solidFill>
+              <a:latin typeface="Segoe UI" panose="020B0502040204020203" pitchFamily="34" charset="0"/>
+              <a:cs typeface="Segoe UI" panose="020B0502040204020203" pitchFamily="34" charset="0"/>
+            </a:endParaRPr>
+          </a:p>
+        </p:txBody>
+      </p:sp>
+      <p:sp>
+        <p:nvSpPr>
+          <p:cNvPr id="35" name="TextBox 34"/>
+          <p:cNvSpPr txBox="1"/>
+          <p:nvPr/>
+        </p:nvSpPr>
+        <p:spPr>
+          <a:xfrm>
+            <a:off x="103517" y="103518"/>
+            <a:ext cx="2001328" cy="369332"/>
+          </a:xfrm>
+          <a:prstGeom prst="rect">
+            <a:avLst/>
+          </a:prstGeom>
+          <a:noFill/>
+        </p:spPr>
+        <p:txBody>
+          <a:bodyPr wrap="square" rtlCol="0">
+            <a:spAutoFit/>
+          </a:bodyPr>
+          <a:lstStyle/>
+          <a:p>
+            <a:r>
+              <a:rPr lang="en-US" dirty="0" smtClean="0">
+                <a:solidFill>
+                  <a:srgbClr val="FF0000"/>
+                </a:solidFill>
+              </a:rPr>
+              <a:t>Page 2: Option 1</a:t>
+            </a:r>
+            <a:endParaRPr lang="en-US" dirty="0">
+              <a:solidFill>
+                <a:srgbClr val="FF0000"/>
+              </a:solidFill>
+            </a:endParaRPr>
+          </a:p>
+        </p:txBody>
+      </p:sp>
       <p:graphicFrame>
         <p:nvGraphicFramePr>
-          <p:cNvPr id="2" name="Table 1"/>
+          <p:cNvPr id="36" name="Table 35"/>
           <p:cNvGraphicFramePr>
             <a:graphicFrameLocks noGrp="1"/>
           </p:cNvGraphicFramePr>
           <p:nvPr>
             <p:extLst>
               <p:ext uri="{D42A27DB-BD31-4B8C-83A1-F6EECF244321}">
-                <p14:modId xmlns:p14="http://schemas.microsoft.com/office/powerpoint/2010/main" val="1271624079"/>
+                <p14:modId xmlns:p14="http://schemas.microsoft.com/office/powerpoint/2010/main" val="1597684434"/>
               </p:ext>
             </p:extLst>
           </p:nvPr>
@@ -5075,8 +7526,8 @@
                     <a:lstStyle/>
                     <a:p>
                       <a:pPr marL="171450" indent="-171450">
-                        <a:buFont typeface="Wingdings" panose="05000000000000000000" pitchFamily="2" charset="2"/>
-                        <a:buChar char="q"/>
+                        <a:buFont typeface="Segoe UI" panose="020B0502040204020203" pitchFamily="34" charset="0"/>
+                        <a:buChar char="■"/>
                       </a:pPr>
                       <a:r>
                         <a:rPr lang="en-US" sz="1000" b="0" dirty="0" smtClean="0">
@@ -5129,8 +7580,8 @@
                     <a:lstStyle/>
                     <a:p>
                       <a:pPr marL="171450" indent="-171450">
-                        <a:buFont typeface="Segoe UI" panose="020B0502040204020203" pitchFamily="34" charset="0"/>
-                        <a:buChar char="■"/>
+                        <a:buFont typeface="Wingdings" panose="05000000000000000000" pitchFamily="2" charset="2"/>
+                        <a:buChar char="q"/>
                       </a:pPr>
                       <a:r>
                         <a:rPr lang="en-US" sz="1000" b="0" dirty="0" smtClean="0">
@@ -5245,8 +7696,8 @@
                     <a:lstStyle/>
                     <a:p>
                       <a:pPr marL="171450" indent="-171450">
-                        <a:buFont typeface="Wingdings" panose="05000000000000000000" pitchFamily="2" charset="2"/>
-                        <a:buChar char="q"/>
+                        <a:buFont typeface="Segoe UI" panose="020B0502040204020203" pitchFamily="34" charset="0"/>
+                        <a:buChar char="■"/>
                       </a:pPr>
                       <a:r>
                         <a:rPr lang="en-US" sz="1000" b="0" dirty="0" smtClean="0">
@@ -5297,8 +7748,8 @@
                     <a:lstStyle/>
                     <a:p>
                       <a:pPr marL="171450" indent="-171450">
-                        <a:buFont typeface="Segoe UI" panose="020B0502040204020203" pitchFamily="34" charset="0"/>
-                        <a:buChar char="■"/>
+                        <a:buFont typeface="Wingdings" panose="05000000000000000000" pitchFamily="2" charset="2"/>
+                        <a:buChar char="q"/>
                       </a:pPr>
                       <a:r>
                         <a:rPr lang="en-US" sz="1000" b="0" dirty="0" smtClean="0">
@@ -5546,243 +7997,6 @@
           </a:graphicData>
         </a:graphic>
       </p:graphicFrame>
-      <p:sp>
-        <p:nvSpPr>
-          <p:cNvPr id="29" name="Rectangle 28"/>
-          <p:cNvSpPr/>
-          <p:nvPr/>
-        </p:nvSpPr>
-        <p:spPr>
-          <a:xfrm>
-            <a:off x="3180271" y="3200396"/>
-            <a:ext cx="2725947" cy="1138687"/>
-          </a:xfrm>
-          <a:prstGeom prst="rect">
-            <a:avLst/>
-          </a:prstGeom>
-          <a:noFill/>
-          <a:ln>
-            <a:solidFill>
-              <a:schemeClr val="tx1">
-                <a:lumMod val="50000"/>
-                <a:lumOff val="50000"/>
-              </a:schemeClr>
-            </a:solidFill>
-          </a:ln>
-        </p:spPr>
-        <p:style>
-          <a:lnRef idx="2">
-            <a:schemeClr val="accent1">
-              <a:shade val="50000"/>
-            </a:schemeClr>
-          </a:lnRef>
-          <a:fillRef idx="1">
-            <a:schemeClr val="accent1"/>
-          </a:fillRef>
-          <a:effectRef idx="0">
-            <a:schemeClr val="accent1"/>
-          </a:effectRef>
-          <a:fontRef idx="minor">
-            <a:schemeClr val="lt1"/>
-          </a:fontRef>
-        </p:style>
-        <p:txBody>
-          <a:bodyPr rtlCol="0" anchor="ctr"/>
-          <a:lstStyle/>
-          <a:p>
-            <a:pPr algn="ctr"/>
-            <a:r>
-              <a:rPr lang="en-US" sz="2400" dirty="0" smtClean="0">
-                <a:solidFill>
-                  <a:schemeClr val="tx1"/>
-                </a:solidFill>
-                <a:latin typeface="Segoe UI" panose="020B0502040204020203" pitchFamily="34" charset="0"/>
-                <a:cs typeface="Segoe UI" panose="020B0502040204020203" pitchFamily="34" charset="0"/>
-              </a:rPr>
-              <a:t>Physical &amp; Mental Health</a:t>
-            </a:r>
-            <a:endParaRPr lang="en-US" sz="2400" dirty="0">
-              <a:solidFill>
-                <a:schemeClr val="tx1"/>
-              </a:solidFill>
-              <a:latin typeface="Segoe UI" panose="020B0502040204020203" pitchFamily="34" charset="0"/>
-              <a:cs typeface="Segoe UI" panose="020B0502040204020203" pitchFamily="34" charset="0"/>
-            </a:endParaRPr>
-          </a:p>
-        </p:txBody>
-      </p:sp>
-      <p:sp>
-        <p:nvSpPr>
-          <p:cNvPr id="33" name="Rectangle 32"/>
-          <p:cNvSpPr/>
-          <p:nvPr/>
-        </p:nvSpPr>
-        <p:spPr>
-          <a:xfrm>
-            <a:off x="7090913" y="6193071"/>
-            <a:ext cx="854015" cy="319178"/>
-          </a:xfrm>
-          <a:prstGeom prst="rect">
-            <a:avLst/>
-          </a:prstGeom>
-          <a:solidFill>
-            <a:schemeClr val="bg2">
-              <a:lumMod val="90000"/>
-            </a:schemeClr>
-          </a:solidFill>
-          <a:ln>
-            <a:solidFill>
-              <a:schemeClr val="tx1">
-                <a:lumMod val="50000"/>
-                <a:lumOff val="50000"/>
-              </a:schemeClr>
-            </a:solidFill>
-          </a:ln>
-        </p:spPr>
-        <p:style>
-          <a:lnRef idx="2">
-            <a:schemeClr val="accent1">
-              <a:shade val="50000"/>
-            </a:schemeClr>
-          </a:lnRef>
-          <a:fillRef idx="1">
-            <a:schemeClr val="accent1"/>
-          </a:fillRef>
-          <a:effectRef idx="0">
-            <a:schemeClr val="accent1"/>
-          </a:effectRef>
-          <a:fontRef idx="minor">
-            <a:schemeClr val="lt1"/>
-          </a:fontRef>
-        </p:style>
-        <p:txBody>
-          <a:bodyPr rtlCol="0" anchor="ctr"/>
-          <a:lstStyle/>
-          <a:p>
-            <a:pPr algn="ctr"/>
-            <a:r>
-              <a:rPr lang="en-US" sz="1600" dirty="0" smtClean="0">
-                <a:solidFill>
-                  <a:schemeClr val="tx1"/>
-                </a:solidFill>
-                <a:latin typeface="Segoe UI" panose="020B0502040204020203" pitchFamily="34" charset="0"/>
-                <a:cs typeface="Segoe UI" panose="020B0502040204020203" pitchFamily="34" charset="0"/>
-              </a:rPr>
-              <a:t>Submit</a:t>
-            </a:r>
-            <a:endParaRPr lang="en-US" sz="1600" dirty="0">
-              <a:solidFill>
-                <a:schemeClr val="tx1"/>
-              </a:solidFill>
-              <a:latin typeface="Segoe UI" panose="020B0502040204020203" pitchFamily="34" charset="0"/>
-              <a:cs typeface="Segoe UI" panose="020B0502040204020203" pitchFamily="34" charset="0"/>
-            </a:endParaRPr>
-          </a:p>
-        </p:txBody>
-      </p:sp>
-      <p:sp>
-        <p:nvSpPr>
-          <p:cNvPr id="34" name="Rectangle 33"/>
-          <p:cNvSpPr/>
-          <p:nvPr/>
-        </p:nvSpPr>
-        <p:spPr>
-          <a:xfrm>
-            <a:off x="6081622" y="3200396"/>
-            <a:ext cx="2725947" cy="1138687"/>
-          </a:xfrm>
-          <a:prstGeom prst="rect">
-            <a:avLst/>
-          </a:prstGeom>
-          <a:noFill/>
-          <a:ln>
-            <a:solidFill>
-              <a:schemeClr val="tx1">
-                <a:lumMod val="50000"/>
-                <a:lumOff val="50000"/>
-              </a:schemeClr>
-            </a:solidFill>
-          </a:ln>
-        </p:spPr>
-        <p:style>
-          <a:lnRef idx="2">
-            <a:schemeClr val="accent1">
-              <a:shade val="50000"/>
-            </a:schemeClr>
-          </a:lnRef>
-          <a:fillRef idx="1">
-            <a:schemeClr val="accent1"/>
-          </a:fillRef>
-          <a:effectRef idx="0">
-            <a:schemeClr val="accent1"/>
-          </a:effectRef>
-          <a:fontRef idx="minor">
-            <a:schemeClr val="lt1"/>
-          </a:fontRef>
-        </p:style>
-        <p:txBody>
-          <a:bodyPr rtlCol="0" anchor="ctr"/>
-          <a:lstStyle/>
-          <a:p>
-            <a:pPr algn="ctr"/>
-            <a:r>
-              <a:rPr lang="en-US" sz="2400" dirty="0" smtClean="0">
-                <a:solidFill>
-                  <a:schemeClr val="tx1"/>
-                </a:solidFill>
-                <a:latin typeface="Segoe UI" panose="020B0502040204020203" pitchFamily="34" charset="0"/>
-                <a:cs typeface="Segoe UI" panose="020B0502040204020203" pitchFamily="34" charset="0"/>
-              </a:rPr>
-              <a:t>Housing</a:t>
-            </a:r>
-            <a:endParaRPr lang="en-US" sz="2400" dirty="0">
-              <a:solidFill>
-                <a:schemeClr val="tx1"/>
-              </a:solidFill>
-              <a:latin typeface="Segoe UI" panose="020B0502040204020203" pitchFamily="34" charset="0"/>
-              <a:cs typeface="Segoe UI" panose="020B0502040204020203" pitchFamily="34" charset="0"/>
-            </a:endParaRPr>
-          </a:p>
-        </p:txBody>
-      </p:sp>
-      <p:sp>
-        <p:nvSpPr>
-          <p:cNvPr id="35" name="TextBox 34"/>
-          <p:cNvSpPr txBox="1"/>
-          <p:nvPr/>
-        </p:nvSpPr>
-        <p:spPr>
-          <a:xfrm>
-            <a:off x="103517" y="103518"/>
-            <a:ext cx="2001328" cy="369332"/>
-          </a:xfrm>
-          <a:prstGeom prst="rect">
-            <a:avLst/>
-          </a:prstGeom>
-          <a:noFill/>
-        </p:spPr>
-        <p:txBody>
-          <a:bodyPr wrap="square" rtlCol="0">
-            <a:spAutoFit/>
-          </a:bodyPr>
-          <a:lstStyle/>
-          <a:p>
-            <a:r>
-              <a:rPr lang="en-US" dirty="0" smtClean="0">
-                <a:solidFill>
-                  <a:srgbClr val="FF0000"/>
-                </a:solidFill>
-              </a:rPr>
-              <a:t>Page 2: Option 1</a:t>
-            </a:r>
-            <a:endParaRPr lang="en-US" dirty="0">
-              <a:solidFill>
-                <a:srgbClr val="FF0000"/>
-              </a:solidFill>
-            </a:endParaRPr>
-          </a:p>
-        </p:txBody>
-      </p:sp>
     </p:spTree>
     <p:extLst>
       <p:ext uri="{BB962C8B-B14F-4D97-AF65-F5344CB8AC3E}">
@@ -6197,7 +8411,7 @@
           <p:nvPr>
             <p:extLst>
               <p:ext uri="{D42A27DB-BD31-4B8C-83A1-F6EECF244321}">
-                <p14:modId xmlns:p14="http://schemas.microsoft.com/office/powerpoint/2010/main" val="1271624079"/>
+                <p14:modId xmlns:p14="http://schemas.microsoft.com/office/powerpoint/2010/main" val="3247206093"/>
               </p:ext>
             </p:extLst>
           </p:nvPr>
@@ -6275,8 +8489,8 @@
                     <a:lstStyle/>
                     <a:p>
                       <a:pPr marL="171450" indent="-171450">
-                        <a:buFont typeface="Wingdings" panose="05000000000000000000" pitchFamily="2" charset="2"/>
-                        <a:buChar char="q"/>
+                        <a:buFont typeface="Segoe UI" panose="020B0502040204020203" pitchFamily="34" charset="0"/>
+                        <a:buChar char="■"/>
                       </a:pPr>
                       <a:r>
                         <a:rPr lang="en-US" sz="1000" b="0" dirty="0" smtClean="0">
@@ -6329,8 +8543,8 @@
                     <a:lstStyle/>
                     <a:p>
                       <a:pPr marL="171450" indent="-171450">
-                        <a:buFont typeface="Segoe UI" panose="020B0502040204020203" pitchFamily="34" charset="0"/>
-                        <a:buChar char="■"/>
+                        <a:buFont typeface="Wingdings" panose="05000000000000000000" pitchFamily="2" charset="2"/>
+                        <a:buChar char="q"/>
                       </a:pPr>
                       <a:r>
                         <a:rPr lang="en-US" sz="1000" b="0" dirty="0" smtClean="0">
@@ -6445,8 +8659,8 @@
                     <a:lstStyle/>
                     <a:p>
                       <a:pPr marL="171450" indent="-171450">
-                        <a:buFont typeface="Wingdings" panose="05000000000000000000" pitchFamily="2" charset="2"/>
-                        <a:buChar char="q"/>
+                        <a:buFont typeface="Segoe UI" panose="020B0502040204020203" pitchFamily="34" charset="0"/>
+                        <a:buChar char="■"/>
                       </a:pPr>
                       <a:r>
                         <a:rPr lang="en-US" sz="1000" b="0" dirty="0" smtClean="0">
@@ -6497,8 +8711,8 @@
                     <a:lstStyle/>
                     <a:p>
                       <a:pPr marL="171450" indent="-171450">
-                        <a:buFont typeface="Segoe UI" panose="020B0502040204020203" pitchFamily="34" charset="0"/>
-                        <a:buChar char="■"/>
+                        <a:buFont typeface="Wingdings" panose="05000000000000000000" pitchFamily="2" charset="2"/>
+                        <a:buChar char="q"/>
                       </a:pPr>
                       <a:r>
                         <a:rPr lang="en-US" sz="1000" b="0" dirty="0" smtClean="0">
@@ -6755,7 +8969,7 @@
           <p:nvPr>
             <p:extLst>
               <p:ext uri="{D42A27DB-BD31-4B8C-83A1-F6EECF244321}">
-                <p14:modId xmlns:p14="http://schemas.microsoft.com/office/powerpoint/2010/main" val="1381427401"/>
+                <p14:modId xmlns:p14="http://schemas.microsoft.com/office/powerpoint/2010/main" val="808220357"/>
               </p:ext>
             </p:extLst>
           </p:nvPr>
@@ -9185,7 +11399,7 @@
           <p:nvPr>
             <p:extLst>
               <p:ext uri="{D42A27DB-BD31-4B8C-83A1-F6EECF244321}">
-                <p14:modId xmlns:p14="http://schemas.microsoft.com/office/powerpoint/2010/main" val="4146650810"/>
+                <p14:modId xmlns:p14="http://schemas.microsoft.com/office/powerpoint/2010/main" val="1441386359"/>
               </p:ext>
             </p:extLst>
           </p:nvPr>
@@ -9263,7 +11477,7 @@
                     <a:bodyPr/>
                     <a:lstStyle/>
                     <a:p>
-                      <a:pPr marL="171450" indent="-171450">
+                      <a:pPr marL="285750" indent="-285750">
                         <a:buFont typeface="Segoe UI" panose="020B0502040204020203" pitchFamily="34" charset="0"/>
                         <a:buChar char="■"/>
                       </a:pPr>
@@ -9275,7 +11489,61 @@
                           <a:latin typeface="Segoe UI" panose="020B0502040204020203" pitchFamily="34" charset="0"/>
                           <a:cs typeface="Segoe UI" panose="020B0502040204020203" pitchFamily="34" charset="0"/>
                         </a:rPr>
-                        <a:t> Borrow</a:t>
+                        <a:t>Adult Literacy</a:t>
+                      </a:r>
+                      <a:endParaRPr lang="en-US" sz="1600" b="0" dirty="0">
+                        <a:solidFill>
+                          <a:schemeClr val="tx1"/>
+                        </a:solidFill>
+                        <a:latin typeface="Segoe UI" panose="020B0502040204020203" pitchFamily="34" charset="0"/>
+                        <a:cs typeface="Segoe UI" panose="020B0502040204020203" pitchFamily="34" charset="0"/>
+                      </a:endParaRPr>
+                    </a:p>
+                  </a:txBody>
+                  <a:tcPr marL="45720" marR="45720">
+                    <a:lnL w="12700" cmpd="sng">
+                      <a:noFill/>
+                    </a:lnL>
+                    <a:lnR w="12700" cmpd="sng">
+                      <a:noFill/>
+                    </a:lnR>
+                    <a:lnT w="38100" cmpd="sng">
+                      <a:noFill/>
+                    </a:lnT>
+                    <a:lnB w="12700" cmpd="sng">
+                      <a:noFill/>
+                    </a:lnB>
+                    <a:lnTlToBr w="12700" cmpd="sng">
+                      <a:noFill/>
+                      <a:prstDash val="solid"/>
+                    </a:lnTlToBr>
+                    <a:lnBlToTr w="12700" cmpd="sng">
+                      <a:noFill/>
+                      <a:prstDash val="solid"/>
+                    </a:lnBlToTr>
+                    <a:noFill/>
+                  </a:tcPr>
+                </a:tc>
+              </a:tr>
+              <a:tr h="435881">
+                <a:tc>
+                  <a:txBody>
+                    <a:bodyPr/>
+                    <a:lstStyle/>
+                    <a:p>
+                      <a:pPr marL="285750" indent="-285750">
+                        <a:buFont typeface="Wingdings" panose="05000000000000000000" pitchFamily="2" charset="2"/>
+                        <a:buChar char="q"/>
+                      </a:pPr>
+                      <a:r>
+                        <a:rPr lang="en-US" sz="1600" b="0" dirty="0" smtClean="0">
+                          <a:solidFill>
+                            <a:schemeClr val="tx1"/>
+                          </a:solidFill>
+                          <a:latin typeface="Segoe UI" panose="020B0502040204020203" pitchFamily="34" charset="0"/>
+                          <a:cs typeface="Segoe UI" panose="020B0502040204020203" pitchFamily="34" charset="0"/>
+                        </a:rPr>
+                        <a:t>Borrow</a:t>
                       </a:r>
                       <a:r>
                         <a:rPr lang="en-US" sz="1600" b="0" baseline="0" dirty="0" smtClean="0">
@@ -9339,7 +11607,115 @@
                           <a:latin typeface="Segoe UI" panose="020B0502040204020203" pitchFamily="34" charset="0"/>
                           <a:cs typeface="Segoe UI" panose="020B0502040204020203" pitchFamily="34" charset="0"/>
                         </a:rPr>
-                        <a:t> Computers</a:t>
+                        <a:t> Childcare</a:t>
+                      </a:r>
+                      <a:endParaRPr lang="en-US" sz="1600" b="0" dirty="0">
+                        <a:solidFill>
+                          <a:schemeClr val="tx1"/>
+                        </a:solidFill>
+                        <a:latin typeface="Segoe UI" panose="020B0502040204020203" pitchFamily="34" charset="0"/>
+                        <a:cs typeface="Segoe UI" panose="020B0502040204020203" pitchFamily="34" charset="0"/>
+                      </a:endParaRPr>
+                    </a:p>
+                  </a:txBody>
+                  <a:tcPr marL="45720" marR="45720">
+                    <a:lnL w="12700" cmpd="sng">
+                      <a:noFill/>
+                    </a:lnL>
+                    <a:lnR w="12700" cmpd="sng">
+                      <a:noFill/>
+                    </a:lnR>
+                    <a:lnT w="38100" cmpd="sng">
+                      <a:noFill/>
+                    </a:lnT>
+                    <a:lnB w="12700" cmpd="sng">
+                      <a:noFill/>
+                    </a:lnB>
+                    <a:lnTlToBr w="12700" cmpd="sng">
+                      <a:noFill/>
+                      <a:prstDash val="solid"/>
+                    </a:lnTlToBr>
+                    <a:lnBlToTr w="12700" cmpd="sng">
+                      <a:noFill/>
+                      <a:prstDash val="solid"/>
+                    </a:lnBlToTr>
+                    <a:noFill/>
+                  </a:tcPr>
+                </a:tc>
+              </a:tr>
+              <a:tr h="435881">
+                <a:tc>
+                  <a:txBody>
+                    <a:bodyPr/>
+                    <a:lstStyle/>
+                    <a:p>
+                      <a:pPr marL="285750" indent="-285750">
+                        <a:buFont typeface="Segoe UI" panose="020B0502040204020203" pitchFamily="34" charset="0"/>
+                        <a:buChar char="■"/>
+                      </a:pPr>
+                      <a:r>
+                        <a:rPr lang="en-US" sz="1600" b="0" dirty="0" smtClean="0">
+                          <a:solidFill>
+                            <a:schemeClr val="tx1"/>
+                          </a:solidFill>
+                          <a:latin typeface="Segoe UI" panose="020B0502040204020203" pitchFamily="34" charset="0"/>
+                          <a:cs typeface="Segoe UI" panose="020B0502040204020203" pitchFamily="34" charset="0"/>
+                        </a:rPr>
+                        <a:t>Computers</a:t>
+                      </a:r>
+                      <a:endParaRPr lang="en-US" sz="1600" b="0" dirty="0">
+                        <a:solidFill>
+                          <a:schemeClr val="tx1"/>
+                        </a:solidFill>
+                        <a:latin typeface="Segoe UI" panose="020B0502040204020203" pitchFamily="34" charset="0"/>
+                        <a:cs typeface="Segoe UI" panose="020B0502040204020203" pitchFamily="34" charset="0"/>
+                      </a:endParaRPr>
+                    </a:p>
+                  </a:txBody>
+                  <a:tcPr marL="45720" marR="45720">
+                    <a:lnL w="12700" cmpd="sng">
+                      <a:noFill/>
+                    </a:lnL>
+                    <a:lnR w="12700" cmpd="sng">
+                      <a:noFill/>
+                    </a:lnR>
+                    <a:lnT w="38100" cmpd="sng">
+                      <a:noFill/>
+                    </a:lnT>
+                    <a:lnB w="12700" cmpd="sng">
+                      <a:noFill/>
+                    </a:lnB>
+                    <a:lnTlToBr w="12700" cmpd="sng">
+                      <a:noFill/>
+                      <a:prstDash val="solid"/>
+                    </a:lnTlToBr>
+                    <a:lnBlToTr w="12700" cmpd="sng">
+                      <a:noFill/>
+                      <a:prstDash val="solid"/>
+                    </a:lnBlToTr>
+                    <a:noFill/>
+                  </a:tcPr>
+                </a:tc>
+              </a:tr>
+              <a:tr h="435881">
+                <a:tc>
+                  <a:txBody>
+                    <a:bodyPr/>
+                    <a:lstStyle/>
+                    <a:p>
+                      <a:pPr marL="285750" indent="-285750">
+                        <a:buFont typeface="Wingdings" panose="05000000000000000000" pitchFamily="2" charset="2"/>
+                        <a:buChar char="q"/>
+                      </a:pPr>
+                      <a:r>
+                        <a:rPr lang="en-US" sz="1600" b="0" dirty="0" smtClean="0">
+                          <a:solidFill>
+                            <a:schemeClr val="tx1"/>
+                          </a:solidFill>
+                          <a:latin typeface="Segoe UI" panose="020B0502040204020203" pitchFamily="34" charset="0"/>
+                          <a:cs typeface="Segoe UI" panose="020B0502040204020203" pitchFamily="34" charset="0"/>
+                        </a:rPr>
+                        <a:t>Library Card</a:t>
                       </a:r>
                       <a:endParaRPr lang="en-US" sz="1600" b="0" dirty="0">
                         <a:solidFill>
@@ -9447,7 +11823,7 @@
                           <a:latin typeface="Segoe UI" panose="020B0502040204020203" pitchFamily="34" charset="0"/>
                           <a:cs typeface="Segoe UI" panose="020B0502040204020203" pitchFamily="34" charset="0"/>
                         </a:rPr>
-                        <a:t> Vocational Training</a:t>
+                        <a:t> Transportation</a:t>
                       </a:r>
                       <a:endParaRPr lang="en-US" sz="1600" b="0" dirty="0">
                         <a:solidFill>
@@ -9501,189 +11877,7 @@
                           <a:latin typeface="Segoe UI" panose="020B0502040204020203" pitchFamily="34" charset="0"/>
                           <a:cs typeface="Segoe UI" panose="020B0502040204020203" pitchFamily="34" charset="0"/>
                         </a:rPr>
-                        <a:t> Adult </a:t>
-                      </a:r>
-                      <a:r>
-                        <a:rPr lang="en-US" sz="1600" b="0" dirty="0" smtClean="0">
-                          <a:solidFill>
-                            <a:schemeClr val="tx1"/>
-                          </a:solidFill>
-                          <a:latin typeface="Segoe UI" panose="020B0502040204020203" pitchFamily="34" charset="0"/>
-                          <a:cs typeface="Segoe UI" panose="020B0502040204020203" pitchFamily="34" charset="0"/>
-                        </a:rPr>
-                        <a:t>Literacy</a:t>
-                      </a:r>
-                      <a:endParaRPr lang="en-US" sz="1600" b="0" dirty="0">
-                        <a:solidFill>
-                          <a:schemeClr val="tx1"/>
-                        </a:solidFill>
-                        <a:latin typeface="Segoe UI" panose="020B0502040204020203" pitchFamily="34" charset="0"/>
-                        <a:cs typeface="Segoe UI" panose="020B0502040204020203" pitchFamily="34" charset="0"/>
-                      </a:endParaRPr>
-                    </a:p>
-                  </a:txBody>
-                  <a:tcPr marL="45720" marR="45720">
-                    <a:lnL w="12700" cmpd="sng">
-                      <a:noFill/>
-                    </a:lnL>
-                    <a:lnR w="12700" cmpd="sng">
-                      <a:noFill/>
-                    </a:lnR>
-                    <a:lnT w="12700" cmpd="sng">
-                      <a:noFill/>
-                    </a:lnT>
-                    <a:lnB w="12700" cmpd="sng">
-                      <a:noFill/>
-                    </a:lnB>
-                    <a:lnTlToBr w="12700" cmpd="sng">
-                      <a:noFill/>
-                      <a:prstDash val="solid"/>
-                    </a:lnTlToBr>
-                    <a:lnBlToTr w="12700" cmpd="sng">
-                      <a:noFill/>
-                      <a:prstDash val="solid"/>
-                    </a:lnBlToTr>
-                    <a:noFill/>
-                  </a:tcPr>
-                </a:tc>
-              </a:tr>
-              <a:tr h="435881">
-                <a:tc>
-                  <a:txBody>
-                    <a:bodyPr/>
-                    <a:lstStyle/>
-                    <a:p>
-                      <a:pPr marL="171450" indent="-171450">
-                        <a:buFont typeface="Wingdings" panose="05000000000000000000" pitchFamily="2" charset="2"/>
-                        <a:buChar char="q"/>
-                      </a:pPr>
-                      <a:r>
-                        <a:rPr lang="en-US" sz="1600" b="0" dirty="0" smtClean="0">
-                          <a:solidFill>
-                            <a:schemeClr val="tx1"/>
-                          </a:solidFill>
-                          <a:latin typeface="Segoe UI" panose="020B0502040204020203" pitchFamily="34" charset="0"/>
-                          <a:cs typeface="Segoe UI" panose="020B0502040204020203" pitchFamily="34" charset="0"/>
-                        </a:rPr>
-                        <a:t> Childcare</a:t>
-                      </a:r>
-                      <a:endParaRPr lang="en-US" sz="1600" b="0" dirty="0">
-                        <a:solidFill>
-                          <a:schemeClr val="tx1"/>
-                        </a:solidFill>
-                        <a:latin typeface="Segoe UI" panose="020B0502040204020203" pitchFamily="34" charset="0"/>
-                        <a:cs typeface="Segoe UI" panose="020B0502040204020203" pitchFamily="34" charset="0"/>
-                      </a:endParaRPr>
-                    </a:p>
-                  </a:txBody>
-                  <a:tcPr marL="45720" marR="45720">
-                    <a:lnL w="12700" cmpd="sng">
-                      <a:noFill/>
-                    </a:lnL>
-                    <a:lnR w="12700" cmpd="sng">
-                      <a:noFill/>
-                    </a:lnR>
-                    <a:lnT w="12700" cmpd="sng">
-                      <a:noFill/>
-                    </a:lnT>
-                    <a:lnB w="12700" cmpd="sng">
-                      <a:noFill/>
-                    </a:lnB>
-                    <a:lnTlToBr w="12700" cmpd="sng">
-                      <a:noFill/>
-                      <a:prstDash val="solid"/>
-                    </a:lnTlToBr>
-                    <a:lnBlToTr w="12700" cmpd="sng">
-                      <a:noFill/>
-                      <a:prstDash val="solid"/>
-                    </a:lnBlToTr>
-                    <a:noFill/>
-                  </a:tcPr>
-                </a:tc>
-              </a:tr>
-              <a:tr h="435881">
-                <a:tc>
-                  <a:txBody>
-                    <a:bodyPr/>
-                    <a:lstStyle/>
-                    <a:p>
-                      <a:pPr marL="171450" indent="-171450">
-                        <a:buFont typeface="Segoe UI" panose="020B0502040204020203" pitchFamily="34" charset="0"/>
-                        <a:buChar char="■"/>
-                      </a:pPr>
-                      <a:r>
-                        <a:rPr lang="en-US" sz="1600" b="0" dirty="0" smtClean="0">
-                          <a:solidFill>
-                            <a:schemeClr val="tx1"/>
-                          </a:solidFill>
-                          <a:latin typeface="Segoe UI" panose="020B0502040204020203" pitchFamily="34" charset="0"/>
-                          <a:cs typeface="Segoe UI" panose="020B0502040204020203" pitchFamily="34" charset="0"/>
-                        </a:rPr>
-                        <a:t> Library </a:t>
-                      </a:r>
-                      <a:r>
-                        <a:rPr lang="en-US" sz="1600" b="0" dirty="0" smtClean="0">
-                          <a:solidFill>
-                            <a:schemeClr val="tx1"/>
-                          </a:solidFill>
-                          <a:latin typeface="Segoe UI" panose="020B0502040204020203" pitchFamily="34" charset="0"/>
-                          <a:cs typeface="Segoe UI" panose="020B0502040204020203" pitchFamily="34" charset="0"/>
-                        </a:rPr>
-                        <a:t>Card</a:t>
-                      </a:r>
-                      <a:endParaRPr lang="en-US" sz="1600" b="0" dirty="0">
-                        <a:solidFill>
-                          <a:schemeClr val="tx1"/>
-                        </a:solidFill>
-                        <a:latin typeface="Segoe UI" panose="020B0502040204020203" pitchFamily="34" charset="0"/>
-                        <a:cs typeface="Segoe UI" panose="020B0502040204020203" pitchFamily="34" charset="0"/>
-                      </a:endParaRPr>
-                    </a:p>
-                  </a:txBody>
-                  <a:tcPr marL="45720" marR="45720">
-                    <a:lnL w="12700" cmpd="sng">
-                      <a:noFill/>
-                    </a:lnL>
-                    <a:lnR w="12700" cmpd="sng">
-                      <a:noFill/>
-                    </a:lnR>
-                    <a:lnT w="12700" cmpd="sng">
-                      <a:noFill/>
-                    </a:lnT>
-                    <a:lnB w="12700" cmpd="sng">
-                      <a:noFill/>
-                    </a:lnB>
-                    <a:lnTlToBr w="12700" cmpd="sng">
-                      <a:noFill/>
-                      <a:prstDash val="solid"/>
-                    </a:lnTlToBr>
-                    <a:lnBlToTr w="12700" cmpd="sng">
-                      <a:noFill/>
-                      <a:prstDash val="solid"/>
-                    </a:lnBlToTr>
-                    <a:noFill/>
-                  </a:tcPr>
-                </a:tc>
-              </a:tr>
-              <a:tr h="435881">
-                <a:tc>
-                  <a:txBody>
-                    <a:bodyPr/>
-                    <a:lstStyle/>
-                    <a:p>
-                      <a:pPr marL="171450" indent="-171450">
-                        <a:buFont typeface="Wingdings" panose="05000000000000000000" pitchFamily="2" charset="2"/>
-                        <a:buChar char="q"/>
-                      </a:pPr>
-                      <a:r>
-                        <a:rPr lang="en-US" sz="1600" b="0" dirty="0" smtClean="0">
-                          <a:solidFill>
-                            <a:schemeClr val="tx1"/>
-                          </a:solidFill>
-                          <a:latin typeface="Segoe UI" panose="020B0502040204020203" pitchFamily="34" charset="0"/>
-                          <a:cs typeface="Segoe UI" panose="020B0502040204020203" pitchFamily="34" charset="0"/>
-                        </a:rPr>
-                        <a:t> Transportation</a:t>
+                        <a:t> Vocational Training</a:t>
                       </a:r>
                       <a:endParaRPr lang="en-US" sz="1600" b="0" dirty="0">
                         <a:solidFill>
@@ -11091,7 +13285,7 @@
           <p:nvPr>
             <p:extLst>
               <p:ext uri="{D42A27DB-BD31-4B8C-83A1-F6EECF244321}">
-                <p14:modId xmlns:p14="http://schemas.microsoft.com/office/powerpoint/2010/main" val="3714188073"/>
+                <p14:modId xmlns:p14="http://schemas.microsoft.com/office/powerpoint/2010/main" val="3995544240"/>
               </p:ext>
             </p:extLst>
           </p:nvPr>
@@ -11181,7 +13375,7 @@
                           <a:latin typeface="Segoe UI" panose="020B0502040204020203" pitchFamily="34" charset="0"/>
                           <a:cs typeface="Segoe UI" panose="020B0502040204020203" pitchFamily="34" charset="0"/>
                         </a:rPr>
-                        <a:t> Dental Services</a:t>
+                        <a:t>Dental Services</a:t>
                       </a:r>
                       <a:endParaRPr lang="en-US" sz="1600" b="0" dirty="0">
                         <a:solidFill>
@@ -11449,7 +13643,7 @@
                     <a:bodyPr/>
                     <a:lstStyle/>
                     <a:p>
-                      <a:pPr marL="171450" indent="-171450">
+                      <a:pPr marL="285750" indent="-285750">
                         <a:buFont typeface="Wingdings" panose="05000000000000000000" pitchFamily="2" charset="2"/>
                         <a:buChar char="q"/>
                       </a:pPr>
@@ -11461,7 +13655,7 @@
                           <a:latin typeface="Segoe UI" panose="020B0502040204020203" pitchFamily="34" charset="0"/>
                           <a:cs typeface="Segoe UI" panose="020B0502040204020203" pitchFamily="34" charset="0"/>
                         </a:rPr>
-                        <a:t> Mental</a:t>
+                        <a:t>Mental</a:t>
                       </a:r>
                       <a:r>
                         <a:rPr lang="en-US" sz="1600" b="0" baseline="0" dirty="0" smtClean="0">
@@ -11471,7 +13665,17 @@
                           <a:latin typeface="Segoe UI" panose="020B0502040204020203" pitchFamily="34" charset="0"/>
                           <a:cs typeface="Segoe UI" panose="020B0502040204020203" pitchFamily="34" charset="0"/>
                         </a:rPr>
-                        <a:t> Health</a:t>
+                        <a:t> </a:t>
+                      </a:r>
+                      <a:r>
+                        <a:rPr lang="en-US" sz="1600" b="0" baseline="0" dirty="0" smtClean="0">
+                          <a:solidFill>
+                            <a:schemeClr val="tx1"/>
+                          </a:solidFill>
+                          <a:latin typeface="Segoe UI" panose="020B0502040204020203" pitchFamily="34" charset="0"/>
+                          <a:cs typeface="Segoe UI" panose="020B0502040204020203" pitchFamily="34" charset="0"/>
+                        </a:rPr>
+                        <a:t>Health</a:t>
                       </a:r>
                       <a:endParaRPr lang="en-US" sz="1600" b="0" dirty="0">
                         <a:solidFill>
@@ -11579,7 +13783,17 @@
                           <a:latin typeface="Segoe UI" panose="020B0502040204020203" pitchFamily="34" charset="0"/>
                           <a:cs typeface="Segoe UI" panose="020B0502040204020203" pitchFamily="34" charset="0"/>
                         </a:rPr>
-                        <a:t> Substance Abuse Treatment</a:t>
+                        <a:t>Substance </a:t>
+                      </a:r>
+                      <a:r>
+                        <a:rPr lang="en-US" sz="1600" b="0" dirty="0" smtClean="0">
+                          <a:solidFill>
+                            <a:schemeClr val="tx1"/>
+                          </a:solidFill>
+                          <a:latin typeface="Segoe UI" panose="020B0502040204020203" pitchFamily="34" charset="0"/>
+                          <a:cs typeface="Segoe UI" panose="020B0502040204020203" pitchFamily="34" charset="0"/>
+                        </a:rPr>
+                        <a:t>Abuse Treatment</a:t>
                       </a:r>
                       <a:endParaRPr lang="en-US" sz="1600" b="0" dirty="0">
                         <a:solidFill>

</xml_diff>